<commit_message>
Powerpoint update plus a few other changes
</commit_message>
<xml_diff>
--- a/cfpy_jupyter_demo.pptx
+++ b/cfpy_jupyter_demo.pptx
@@ -5,22 +5,23 @@
     <p:sldMasterId id="2147483696" r:id="rId4"/>
   </p:sldMasterIdLst>
   <p:notesMasterIdLst>
-    <p:notesMasterId r:id="rId18"/>
+    <p:notesMasterId r:id="rId19"/>
   </p:notesMasterIdLst>
   <p:sldIdLst>
     <p:sldId id="306" r:id="rId5"/>
-    <p:sldId id="314" r:id="rId6"/>
-    <p:sldId id="315" r:id="rId7"/>
-    <p:sldId id="316" r:id="rId8"/>
-    <p:sldId id="317" r:id="rId9"/>
-    <p:sldId id="318" r:id="rId10"/>
-    <p:sldId id="319" r:id="rId11"/>
-    <p:sldId id="320" r:id="rId12"/>
-    <p:sldId id="325" r:id="rId13"/>
-    <p:sldId id="322" r:id="rId14"/>
-    <p:sldId id="311" r:id="rId15"/>
-    <p:sldId id="324" r:id="rId16"/>
-    <p:sldId id="312" r:id="rId17"/>
+    <p:sldId id="326" r:id="rId6"/>
+    <p:sldId id="314" r:id="rId7"/>
+    <p:sldId id="315" r:id="rId8"/>
+    <p:sldId id="316" r:id="rId9"/>
+    <p:sldId id="317" r:id="rId10"/>
+    <p:sldId id="318" r:id="rId11"/>
+    <p:sldId id="319" r:id="rId12"/>
+    <p:sldId id="320" r:id="rId13"/>
+    <p:sldId id="325" r:id="rId14"/>
+    <p:sldId id="322" r:id="rId15"/>
+    <p:sldId id="311" r:id="rId16"/>
+    <p:sldId id="324" r:id="rId17"/>
+    <p:sldId id="312" r:id="rId18"/>
   </p:sldIdLst>
   <p:sldSz cx="12192000" cy="6858000"/>
   <p:notesSz cx="6858000" cy="9144000"/>
@@ -231,7 +232,7 @@
           <a:p>
             <a:fld id="{5EA28068-AFBD-4979-B752-9EB6F90B1386}" type="datetimeFigureOut">
               <a:rPr lang="en-US" smtClean="0"/>
-              <a:t>4/17/2023</a:t>
+              <a:t>4/19/2023</a:t>
             </a:fld>
             <a:endParaRPr lang="en-US" dirty="0"/>
           </a:p>
@@ -11218,13 +11219,13 @@
         <p:spPr/>
         <p:txBody>
           <a:bodyPr>
-            <a:normAutofit fontScale="90000"/>
+            <a:normAutofit/>
           </a:bodyPr>
           <a:lstStyle/>
           <a:p>
             <a:r>
               <a:rPr lang="en-US" dirty="0"/>
-              <a:t>Creole Forth in a jupyter  notebook demo</a:t>
+              <a:t>Forth in a jupyter  notebook</a:t>
             </a:r>
           </a:p>
         </p:txBody>
@@ -11304,7 +11305,7 @@
           <p:cNvPr id="2" name="Title 1">
             <a:extLst>
               <a:ext uri="{FF2B5EF4-FFF2-40B4-BE49-F238E27FC236}">
-                <a16:creationId xmlns:a16="http://schemas.microsoft.com/office/drawing/2014/main" id="{AABA68F8-E06D-4FF5-8C88-E706F6006142}"/>
+                <a16:creationId xmlns:a16="http://schemas.microsoft.com/office/drawing/2014/main" id="{B43260D8-B7EA-C4D0-58BB-BE04086922D6}"/>
               </a:ext>
             </a:extLst>
           </p:cNvPr>
@@ -11315,21 +11316,16 @@
             <p:ph type="title"/>
           </p:nvPr>
         </p:nvSpPr>
-        <p:spPr>
-          <a:xfrm>
-            <a:off x="576071" y="365125"/>
-            <a:ext cx="10922821" cy="1325563"/>
-          </a:xfrm>
-        </p:spPr>
+        <p:spPr/>
         <p:txBody>
           <a:bodyPr>
-            <a:normAutofit/>
+            <a:normAutofit fontScale="90000"/>
           </a:bodyPr>
           <a:lstStyle/>
           <a:p>
             <a:r>
               <a:rPr lang="en-US" dirty="0"/>
-              <a:t>Example – todo list/log</a:t>
+              <a:t>EXAMPLE: MACHINE LEARNING</a:t>
             </a:r>
           </a:p>
         </p:txBody>
@@ -11339,7 +11335,7 @@
           <p:cNvPr id="3" name="Content Placeholder 2">
             <a:extLst>
               <a:ext uri="{FF2B5EF4-FFF2-40B4-BE49-F238E27FC236}">
-                <a16:creationId xmlns:a16="http://schemas.microsoft.com/office/drawing/2014/main" id="{A626D724-BEEE-D83F-374A-647292DD5F91}"/>
+                <a16:creationId xmlns:a16="http://schemas.microsoft.com/office/drawing/2014/main" id="{E947289B-D921-8279-E887-4ACBA1FF66A5}"/>
               </a:ext>
             </a:extLst>
           </p:cNvPr>
@@ -11348,6 +11344,81 @@
           </p:cNvSpPr>
           <p:nvPr>
             <p:ph idx="1"/>
+          </p:nvPr>
+        </p:nvSpPr>
+        <p:spPr/>
+        <p:txBody>
+          <a:bodyPr>
+            <a:normAutofit fontScale="70000" lnSpcReduction="20000"/>
+          </a:bodyPr>
+          <a:lstStyle/>
+          <a:p>
+            <a:r>
+              <a:rPr lang="en-US" dirty="0"/>
+              <a:t>Data analyzed is of thousands of urls which are classified as phishing, suspicious or legitimate.</a:t>
+            </a:r>
+          </a:p>
+          <a:p>
+            <a:r>
+              <a:rPr lang="en-US" dirty="0"/>
+              <a:t>Exploratory data analysis, data cleaning, and looking for data correlations was initially done.</a:t>
+            </a:r>
+          </a:p>
+          <a:p>
+            <a:r>
+              <a:rPr lang="en-US" dirty="0"/>
+              <a:t>It was followed up with binary classification to mark sites as phishing or non-phishing.</a:t>
+            </a:r>
+          </a:p>
+          <a:p>
+            <a:r>
+              <a:rPr lang="en-US" dirty="0"/>
+              <a:t>First logistic regression was done with plots to show the effectiveness of the model. </a:t>
+            </a:r>
+          </a:p>
+          <a:p>
+            <a:r>
+              <a:rPr lang="en-US" dirty="0"/>
+              <a:t>It was then validated with K-fold cross-validation. </a:t>
+            </a:r>
+          </a:p>
+          <a:p>
+            <a:r>
+              <a:rPr lang="en-US" dirty="0"/>
+              <a:t>This is a methodology that resamples data in order to find the efficacy of machine learning models. </a:t>
+            </a:r>
+          </a:p>
+          <a:p>
+            <a:r>
+              <a:rPr lang="en-US" dirty="0"/>
+              <a:t>Data is split into K subsamples. Each subsample is used as a testing set, while the remainder are used as training sets.</a:t>
+            </a:r>
+          </a:p>
+          <a:p>
+            <a:r>
+              <a:rPr lang="en-US" dirty="0"/>
+              <a:t>It checks the performance of the model on new data in order to avoid overfitting or underfitting the model.</a:t>
+            </a:r>
+          </a:p>
+          <a:p>
+            <a:endParaRPr lang="en-US" dirty="0"/>
+          </a:p>
+        </p:txBody>
+      </p:sp>
+      <p:sp>
+        <p:nvSpPr>
+          <p:cNvPr id="4" name="Date Placeholder 3">
+            <a:extLst>
+              <a:ext uri="{FF2B5EF4-FFF2-40B4-BE49-F238E27FC236}">
+                <a16:creationId xmlns:a16="http://schemas.microsoft.com/office/drawing/2014/main" id="{ECA3E3B6-FC0F-3684-ECA8-761F1F05A209}"/>
+              </a:ext>
+            </a:extLst>
+          </p:cNvPr>
+          <p:cNvSpPr>
+            <a:spLocks noGrp="1"/>
+          </p:cNvSpPr>
+          <p:nvPr>
+            <p:ph type="dt" sz="half" idx="10"/>
           </p:nvPr>
         </p:nvSpPr>
         <p:spPr/>
@@ -11357,57 +11428,25 @@
           <a:p>
             <a:r>
               <a:rPr lang="en-US" dirty="0"/>
-              <a:t>GUI front-end is built in Lazarus.</a:t>
-            </a:r>
-          </a:p>
-          <a:p>
-            <a:r>
-              <a:rPr lang="en-US" dirty="0"/>
-              <a:t>It has two tabs, one for the list and the other for the log.</a:t>
-            </a:r>
-          </a:p>
-          <a:p>
-            <a:r>
-              <a:rPr lang="en-US" dirty="0"/>
-              <a:t>Dialog box is called as an executable.</a:t>
-            </a:r>
-          </a:p>
-          <a:p>
-            <a:r>
-              <a:rPr lang="en-US" dirty="0"/>
-              <a:t>The next cell executed has Creole Forth for Python code which uploads the saved text files to Dropbox.</a:t>
-            </a:r>
-          </a:p>
-          <a:p>
-            <a:r>
-              <a:rPr lang="en-US" dirty="0"/>
-              <a:t>The files in Dropbox can then be viewed from any device with access </a:t>
-            </a:r>
-            <a:r>
-              <a:rPr lang="en-US" dirty="0" err="1"/>
-              <a:t>fo</a:t>
-            </a:r>
-            <a:r>
-              <a:rPr lang="en-US" dirty="0"/>
-              <a:t> Dropbox, such as an iPad or Android. </a:t>
-            </a:r>
-          </a:p>
-        </p:txBody>
-      </p:sp>
-      <p:sp>
-        <p:nvSpPr>
-          <p:cNvPr id="4" name="Date Placeholder 3">
-            <a:extLst>
-              <a:ext uri="{FF2B5EF4-FFF2-40B4-BE49-F238E27FC236}">
-                <a16:creationId xmlns:a16="http://schemas.microsoft.com/office/drawing/2014/main" id="{C726D14F-0A39-933A-35A3-917E319C8213}"/>
-              </a:ext>
-            </a:extLst>
-          </p:cNvPr>
-          <p:cNvSpPr>
-            <a:spLocks noGrp="1"/>
-          </p:cNvSpPr>
-          <p:nvPr>
-            <p:ph type="dt" sz="half" idx="10"/>
+              <a:t>April 2023</a:t>
+            </a:r>
+          </a:p>
+        </p:txBody>
+      </p:sp>
+      <p:sp>
+        <p:nvSpPr>
+          <p:cNvPr id="5" name="Footer Placeholder 4">
+            <a:extLst>
+              <a:ext uri="{FF2B5EF4-FFF2-40B4-BE49-F238E27FC236}">
+                <a16:creationId xmlns:a16="http://schemas.microsoft.com/office/drawing/2014/main" id="{8EDB4C77-6587-40AF-3904-A5A226A4651D}"/>
+              </a:ext>
+            </a:extLst>
+          </p:cNvPr>
+          <p:cNvSpPr>
+            <a:spLocks noGrp="1"/>
+          </p:cNvSpPr>
+          <p:nvPr>
+            <p:ph type="ftr" sz="quarter" idx="11"/>
           </p:nvPr>
         </p:nvSpPr>
         <p:spPr/>
@@ -11415,38 +11454,6 @@
           <a:bodyPr/>
           <a:lstStyle/>
           <a:p>
-            <a:r>
-              <a:rPr lang="en-US" dirty="0"/>
-              <a:t>April 2023</a:t>
-            </a:r>
-          </a:p>
-        </p:txBody>
-      </p:sp>
-      <p:sp>
-        <p:nvSpPr>
-          <p:cNvPr id="5" name="Footer Placeholder 4">
-            <a:extLst>
-              <a:ext uri="{FF2B5EF4-FFF2-40B4-BE49-F238E27FC236}">
-                <a16:creationId xmlns:a16="http://schemas.microsoft.com/office/drawing/2014/main" id="{4809160A-7AB3-E820-02ED-7C09D0744D5D}"/>
-              </a:ext>
-            </a:extLst>
-          </p:cNvPr>
-          <p:cNvSpPr>
-            <a:spLocks noGrp="1"/>
-          </p:cNvSpPr>
-          <p:nvPr>
-            <p:ph type="ftr" sz="quarter" idx="11"/>
-          </p:nvPr>
-        </p:nvSpPr>
-        <p:spPr/>
-        <p:txBody>
-          <a:bodyPr/>
-          <a:lstStyle/>
-          <a:p>
-            <a:r>
-              <a:rPr lang="en-US"/>
-              <a:t>Presentation Title</a:t>
-            </a:r>
             <a:endParaRPr lang="en-US" dirty="0"/>
           </a:p>
         </p:txBody>
@@ -11456,7 +11463,7 @@
           <p:cNvPr id="6" name="Slide Number Placeholder 5">
             <a:extLst>
               <a:ext uri="{FF2B5EF4-FFF2-40B4-BE49-F238E27FC236}">
-                <a16:creationId xmlns:a16="http://schemas.microsoft.com/office/drawing/2014/main" id="{4BF5C1C1-DEEF-082A-5245-EE1683D6E358}"/>
+                <a16:creationId xmlns:a16="http://schemas.microsoft.com/office/drawing/2014/main" id="{D1BC21BC-E143-9341-BF16-9C73184C9CDB}"/>
               </a:ext>
             </a:extLst>
           </p:cNvPr>
@@ -11484,7 +11491,7 @@
     </p:spTree>
     <p:extLst>
       <p:ext uri="{BB962C8B-B14F-4D97-AF65-F5344CB8AC3E}">
-        <p14:creationId xmlns:p14="http://schemas.microsoft.com/office/powerpoint/2010/main" val="1958279266"/>
+        <p14:creationId xmlns:p14="http://schemas.microsoft.com/office/powerpoint/2010/main" val="3113115795"/>
       </p:ext>
     </p:extLst>
   </p:cSld>
@@ -11516,15 +11523,50 @@
           <p:cNvPr id="2" name="Title 1">
             <a:extLst>
               <a:ext uri="{FF2B5EF4-FFF2-40B4-BE49-F238E27FC236}">
-                <a16:creationId xmlns:a16="http://schemas.microsoft.com/office/drawing/2014/main" id="{009FB28F-C9D7-439B-B863-44B4E851A0B0}"/>
-              </a:ext>
-            </a:extLst>
-          </p:cNvPr>
-          <p:cNvSpPr>
-            <a:spLocks noGrp="1"/>
-          </p:cNvSpPr>
-          <p:nvPr>
-            <p:ph type="ctrTitle"/>
+                <a16:creationId xmlns:a16="http://schemas.microsoft.com/office/drawing/2014/main" id="{AABA68F8-E06D-4FF5-8C88-E706F6006142}"/>
+              </a:ext>
+            </a:extLst>
+          </p:cNvPr>
+          <p:cNvSpPr>
+            <a:spLocks noGrp="1"/>
+          </p:cNvSpPr>
+          <p:nvPr>
+            <p:ph type="title"/>
+          </p:nvPr>
+        </p:nvSpPr>
+        <p:spPr>
+          <a:xfrm>
+            <a:off x="576071" y="365125"/>
+            <a:ext cx="10922821" cy="1325563"/>
+          </a:xfrm>
+        </p:spPr>
+        <p:txBody>
+          <a:bodyPr>
+            <a:normAutofit/>
+          </a:bodyPr>
+          <a:lstStyle/>
+          <a:p>
+            <a:r>
+              <a:rPr lang="en-US" dirty="0"/>
+              <a:t>Example – todo list/log</a:t>
+            </a:r>
+          </a:p>
+        </p:txBody>
+      </p:sp>
+      <p:sp>
+        <p:nvSpPr>
+          <p:cNvPr id="3" name="Content Placeholder 2">
+            <a:extLst>
+              <a:ext uri="{FF2B5EF4-FFF2-40B4-BE49-F238E27FC236}">
+                <a16:creationId xmlns:a16="http://schemas.microsoft.com/office/drawing/2014/main" id="{A626D724-BEEE-D83F-374A-647292DD5F91}"/>
+              </a:ext>
+            </a:extLst>
+          </p:cNvPr>
+          <p:cNvSpPr>
+            <a:spLocks noGrp="1"/>
+          </p:cNvSpPr>
+          <p:nvPr>
+            <p:ph idx="1"/>
           </p:nvPr>
         </p:nvSpPr>
         <p:spPr/>
@@ -11534,25 +11576,57 @@
           <a:p>
             <a:r>
               <a:rPr lang="en-US" dirty="0"/>
-              <a:t>Summary</a:t>
-            </a:r>
-          </a:p>
-        </p:txBody>
-      </p:sp>
-      <p:sp>
-        <p:nvSpPr>
-          <p:cNvPr id="8" name="Subtitle 7">
-            <a:extLst>
-              <a:ext uri="{FF2B5EF4-FFF2-40B4-BE49-F238E27FC236}">
-                <a16:creationId xmlns:a16="http://schemas.microsoft.com/office/drawing/2014/main" id="{50061247-EA4F-4DFA-AFCE-648487762CF7}"/>
-              </a:ext>
-            </a:extLst>
-          </p:cNvPr>
-          <p:cNvSpPr>
-            <a:spLocks noGrp="1"/>
-          </p:cNvSpPr>
-          <p:nvPr>
-            <p:ph type="subTitle" idx="1"/>
+              <a:t>GUI front-end is built in Lazarus.</a:t>
+            </a:r>
+          </a:p>
+          <a:p>
+            <a:r>
+              <a:rPr lang="en-US" dirty="0"/>
+              <a:t>It has two tabs, one for the list and the other for the log.</a:t>
+            </a:r>
+          </a:p>
+          <a:p>
+            <a:r>
+              <a:rPr lang="en-US" dirty="0"/>
+              <a:t>Dialog box is called as an executable.</a:t>
+            </a:r>
+          </a:p>
+          <a:p>
+            <a:r>
+              <a:rPr lang="en-US" dirty="0"/>
+              <a:t>The next cell executed has Creole Forth for Python code which uploads the saved text files to Dropbox.</a:t>
+            </a:r>
+          </a:p>
+          <a:p>
+            <a:r>
+              <a:rPr lang="en-US" dirty="0"/>
+              <a:t>The files in Dropbox can then be viewed from any device with </a:t>
+            </a:r>
+            <a:r>
+              <a:rPr lang="en-US"/>
+              <a:t>access to Dropbox</a:t>
+            </a:r>
+            <a:r>
+              <a:rPr lang="en-US" dirty="0"/>
+              <a:t>, such as an iPad or Android. </a:t>
+            </a:r>
+          </a:p>
+        </p:txBody>
+      </p:sp>
+      <p:sp>
+        <p:nvSpPr>
+          <p:cNvPr id="4" name="Date Placeholder 3">
+            <a:extLst>
+              <a:ext uri="{FF2B5EF4-FFF2-40B4-BE49-F238E27FC236}">
+                <a16:creationId xmlns:a16="http://schemas.microsoft.com/office/drawing/2014/main" id="{C726D14F-0A39-933A-35A3-917E319C8213}"/>
+              </a:ext>
+            </a:extLst>
+          </p:cNvPr>
+          <p:cNvSpPr>
+            <a:spLocks noGrp="1"/>
+          </p:cNvSpPr>
+          <p:nvPr>
+            <p:ph type="dt" sz="half" idx="10"/>
           </p:nvPr>
         </p:nvSpPr>
         <p:spPr/>
@@ -11562,92 +11636,17 @@
           <a:p>
             <a:r>
               <a:rPr lang="en-US" dirty="0"/>
-              <a:t>1. Jupyter notebook is an effective IDE for interactive development.</a:t>
-            </a:r>
-          </a:p>
-          <a:p>
-            <a:r>
-              <a:rPr lang="en-US" dirty="0"/>
-              <a:t>2. A Forth written in Python can be adapted to use it without great effort. </a:t>
-            </a:r>
-          </a:p>
-        </p:txBody>
-      </p:sp>
-      <p:pic>
-        <p:nvPicPr>
-          <p:cNvPr id="22" name="Picture Placeholder 21" descr="mountains under near dusk sky">
-            <a:extLst>
-              <a:ext uri="{FF2B5EF4-FFF2-40B4-BE49-F238E27FC236}">
-                <a16:creationId xmlns:a16="http://schemas.microsoft.com/office/drawing/2014/main" id="{D8AC51EB-1C22-4303-8354-FC97950C7DE6}"/>
-              </a:ext>
-            </a:extLst>
-          </p:cNvPr>
-          <p:cNvPicPr>
-            <a:picLocks noGrp="1" noChangeAspect="1"/>
-          </p:cNvPicPr>
-          <p:nvPr>
-            <p:ph type="pic" sz="quarter" idx="13"/>
-          </p:nvPr>
-        </p:nvPicPr>
-        <p:blipFill rotWithShape="1">
-          <a:blip r:embed="rId2"/>
-          <a:srcRect t="63" b="63"/>
-          <a:stretch/>
-        </p:blipFill>
-        <p:spPr/>
-      </p:pic>
-      <p:pic>
-        <p:nvPicPr>
-          <p:cNvPr id="18" name="Picture Placeholder 17" descr="mountains at sunset">
-            <a:extLst>
-              <a:ext uri="{FF2B5EF4-FFF2-40B4-BE49-F238E27FC236}">
-                <a16:creationId xmlns:a16="http://schemas.microsoft.com/office/drawing/2014/main" id="{B503D699-E643-4969-9463-5C6331D0C869}"/>
-              </a:ext>
-            </a:extLst>
-          </p:cNvPr>
-          <p:cNvPicPr>
-            <a:picLocks noGrp="1" noChangeAspect="1"/>
-          </p:cNvPicPr>
-          <p:nvPr>
-            <p:ph type="pic" sz="quarter" idx="14"/>
-          </p:nvPr>
-        </p:nvPicPr>
-        <p:blipFill rotWithShape="1">
-          <a:blip r:embed="rId3"/>
-          <a:srcRect t="177" b="177"/>
-          <a:stretch/>
-        </p:blipFill>
-        <p:spPr/>
-      </p:pic>
-      <p:pic>
-        <p:nvPicPr>
-          <p:cNvPr id="20" name="Picture Placeholder 19" descr="mountains at sunset">
-            <a:extLst>
-              <a:ext uri="{FF2B5EF4-FFF2-40B4-BE49-F238E27FC236}">
-                <a16:creationId xmlns:a16="http://schemas.microsoft.com/office/drawing/2014/main" id="{B8714555-7486-4DD7-A96C-52C276483584}"/>
-              </a:ext>
-            </a:extLst>
-          </p:cNvPr>
-          <p:cNvPicPr>
-            <a:picLocks noGrp="1" noChangeAspect="1"/>
-          </p:cNvPicPr>
-          <p:nvPr>
-            <p:ph type="pic" sz="quarter" idx="15"/>
-          </p:nvPr>
-        </p:nvPicPr>
-        <p:blipFill rotWithShape="1">
-          <a:blip r:embed="rId4"/>
-          <a:srcRect t="209" b="209"/>
-          <a:stretch/>
-        </p:blipFill>
-        <p:spPr/>
-      </p:pic>
-      <p:sp>
-        <p:nvSpPr>
-          <p:cNvPr id="23" name="Footer Placeholder 22">
-            <a:extLst>
-              <a:ext uri="{FF2B5EF4-FFF2-40B4-BE49-F238E27FC236}">
-                <a16:creationId xmlns:a16="http://schemas.microsoft.com/office/drawing/2014/main" id="{249ACE4E-0038-4BA2-8883-8C3F73B79C44}"/>
+              <a:t>April 2023</a:t>
+            </a:r>
+          </a:p>
+        </p:txBody>
+      </p:sp>
+      <p:sp>
+        <p:nvSpPr>
+          <p:cNvPr id="5" name="Footer Placeholder 4">
+            <a:extLst>
+              <a:ext uri="{FF2B5EF4-FFF2-40B4-BE49-F238E27FC236}">
+                <a16:creationId xmlns:a16="http://schemas.microsoft.com/office/drawing/2014/main" id="{4809160A-7AB3-E820-02ED-7C09D0744D5D}"/>
               </a:ext>
             </a:extLst>
           </p:cNvPr>
@@ -11664,18 +11663,19 @@
           <a:lstStyle/>
           <a:p>
             <a:r>
-              <a:rPr lang="en-US" dirty="0"/>
+              <a:rPr lang="en-US"/>
               <a:t>Presentation Title</a:t>
             </a:r>
-          </a:p>
-        </p:txBody>
-      </p:sp>
-      <p:sp>
-        <p:nvSpPr>
-          <p:cNvPr id="24" name="Slide Number Placeholder 23">
-            <a:extLst>
-              <a:ext uri="{FF2B5EF4-FFF2-40B4-BE49-F238E27FC236}">
-                <a16:creationId xmlns:a16="http://schemas.microsoft.com/office/drawing/2014/main" id="{9A686A52-7630-4675-B383-8C2AD252EC1F}"/>
+            <a:endParaRPr lang="en-US" dirty="0"/>
+          </a:p>
+        </p:txBody>
+      </p:sp>
+      <p:sp>
+        <p:nvSpPr>
+          <p:cNvPr id="6" name="Slide Number Placeholder 5">
+            <a:extLst>
+              <a:ext uri="{FF2B5EF4-FFF2-40B4-BE49-F238E27FC236}">
+                <a16:creationId xmlns:a16="http://schemas.microsoft.com/office/drawing/2014/main" id="{4BF5C1C1-DEEF-082A-5245-EE1683D6E358}"/>
               </a:ext>
             </a:extLst>
           </p:cNvPr>
@@ -11703,7 +11703,7 @@
     </p:spTree>
     <p:extLst>
       <p:ext uri="{BB962C8B-B14F-4D97-AF65-F5344CB8AC3E}">
-        <p14:creationId xmlns:p14="http://schemas.microsoft.com/office/powerpoint/2010/main" val="3584772686"/>
+        <p14:creationId xmlns:p14="http://schemas.microsoft.com/office/powerpoint/2010/main" val="1958279266"/>
       </p:ext>
     </p:extLst>
   </p:cSld>
@@ -11735,15 +11735,15 @@
           <p:cNvPr id="2" name="Title 1">
             <a:extLst>
               <a:ext uri="{FF2B5EF4-FFF2-40B4-BE49-F238E27FC236}">
-                <a16:creationId xmlns:a16="http://schemas.microsoft.com/office/drawing/2014/main" id="{A95FDEDF-85E7-74CB-9C99-3AC2A8FC5F97}"/>
-              </a:ext>
-            </a:extLst>
-          </p:cNvPr>
-          <p:cNvSpPr>
-            <a:spLocks noGrp="1"/>
-          </p:cNvSpPr>
-          <p:nvPr>
-            <p:ph type="title"/>
+                <a16:creationId xmlns:a16="http://schemas.microsoft.com/office/drawing/2014/main" id="{009FB28F-C9D7-439B-B863-44B4E851A0B0}"/>
+              </a:ext>
+            </a:extLst>
+          </p:cNvPr>
+          <p:cNvSpPr>
+            <a:spLocks noGrp="1"/>
+          </p:cNvSpPr>
+          <p:nvPr>
+            <p:ph type="ctrTitle"/>
           </p:nvPr>
         </p:nvSpPr>
         <p:spPr/>
@@ -11753,25 +11753,25 @@
           <a:p>
             <a:r>
               <a:rPr lang="en-US" dirty="0"/>
-              <a:t>Questions/comments?</a:t>
-            </a:r>
-          </a:p>
-        </p:txBody>
-      </p:sp>
-      <p:sp>
-        <p:nvSpPr>
-          <p:cNvPr id="3" name="Content Placeholder 2">
-            <a:extLst>
-              <a:ext uri="{FF2B5EF4-FFF2-40B4-BE49-F238E27FC236}">
-                <a16:creationId xmlns:a16="http://schemas.microsoft.com/office/drawing/2014/main" id="{65F2A567-C017-B347-7085-4A21BE4DAF8B}"/>
-              </a:ext>
-            </a:extLst>
-          </p:cNvPr>
-          <p:cNvSpPr>
-            <a:spLocks noGrp="1"/>
-          </p:cNvSpPr>
-          <p:nvPr>
-            <p:ph idx="1"/>
+              <a:t>Summary</a:t>
+            </a:r>
+          </a:p>
+        </p:txBody>
+      </p:sp>
+      <p:sp>
+        <p:nvSpPr>
+          <p:cNvPr id="8" name="Subtitle 7">
+            <a:extLst>
+              <a:ext uri="{FF2B5EF4-FFF2-40B4-BE49-F238E27FC236}">
+                <a16:creationId xmlns:a16="http://schemas.microsoft.com/office/drawing/2014/main" id="{50061247-EA4F-4DFA-AFCE-648487762CF7}"/>
+              </a:ext>
+            </a:extLst>
+          </p:cNvPr>
+          <p:cNvSpPr>
+            <a:spLocks noGrp="1"/>
+          </p:cNvSpPr>
+          <p:nvPr>
+            <p:ph type="subTitle" idx="1"/>
           </p:nvPr>
         </p:nvSpPr>
         <p:spPr/>
@@ -11781,25 +11781,100 @@
           <a:p>
             <a:r>
               <a:rPr lang="en-US" dirty="0"/>
-              <a:t>Reach me at tiluser0@gmail.com</a:t>
-            </a:r>
-          </a:p>
-        </p:txBody>
-      </p:sp>
-      <p:sp>
-        <p:nvSpPr>
-          <p:cNvPr id="4" name="Date Placeholder 3">
-            <a:extLst>
-              <a:ext uri="{FF2B5EF4-FFF2-40B4-BE49-F238E27FC236}">
-                <a16:creationId xmlns:a16="http://schemas.microsoft.com/office/drawing/2014/main" id="{5BB84B1C-F5D2-D18A-13A4-8E8A5002E005}"/>
-              </a:ext>
-            </a:extLst>
-          </p:cNvPr>
-          <p:cNvSpPr>
-            <a:spLocks noGrp="1"/>
-          </p:cNvSpPr>
-          <p:nvPr>
-            <p:ph type="dt" sz="half" idx="10"/>
+              <a:t>1. Jupyter notebook is an effective IDE for interactive development.</a:t>
+            </a:r>
+          </a:p>
+          <a:p>
+            <a:r>
+              <a:rPr lang="en-US" dirty="0"/>
+              <a:t>2. A Forth written in Python can be adapted to use it without great effort. </a:t>
+            </a:r>
+          </a:p>
+        </p:txBody>
+      </p:sp>
+      <p:pic>
+        <p:nvPicPr>
+          <p:cNvPr id="22" name="Picture Placeholder 21" descr="mountains under near dusk sky">
+            <a:extLst>
+              <a:ext uri="{FF2B5EF4-FFF2-40B4-BE49-F238E27FC236}">
+                <a16:creationId xmlns:a16="http://schemas.microsoft.com/office/drawing/2014/main" id="{D8AC51EB-1C22-4303-8354-FC97950C7DE6}"/>
+              </a:ext>
+            </a:extLst>
+          </p:cNvPr>
+          <p:cNvPicPr>
+            <a:picLocks noGrp="1" noChangeAspect="1"/>
+          </p:cNvPicPr>
+          <p:nvPr>
+            <p:ph type="pic" sz="quarter" idx="13"/>
+          </p:nvPr>
+        </p:nvPicPr>
+        <p:blipFill rotWithShape="1">
+          <a:blip r:embed="rId2"/>
+          <a:srcRect t="63" b="63"/>
+          <a:stretch/>
+        </p:blipFill>
+        <p:spPr/>
+      </p:pic>
+      <p:pic>
+        <p:nvPicPr>
+          <p:cNvPr id="18" name="Picture Placeholder 17" descr="mountains at sunset">
+            <a:extLst>
+              <a:ext uri="{FF2B5EF4-FFF2-40B4-BE49-F238E27FC236}">
+                <a16:creationId xmlns:a16="http://schemas.microsoft.com/office/drawing/2014/main" id="{B503D699-E643-4969-9463-5C6331D0C869}"/>
+              </a:ext>
+            </a:extLst>
+          </p:cNvPr>
+          <p:cNvPicPr>
+            <a:picLocks noGrp="1" noChangeAspect="1"/>
+          </p:cNvPicPr>
+          <p:nvPr>
+            <p:ph type="pic" sz="quarter" idx="14"/>
+          </p:nvPr>
+        </p:nvPicPr>
+        <p:blipFill rotWithShape="1">
+          <a:blip r:embed="rId3"/>
+          <a:srcRect t="177" b="177"/>
+          <a:stretch/>
+        </p:blipFill>
+        <p:spPr/>
+      </p:pic>
+      <p:pic>
+        <p:nvPicPr>
+          <p:cNvPr id="20" name="Picture Placeholder 19" descr="mountains at sunset">
+            <a:extLst>
+              <a:ext uri="{FF2B5EF4-FFF2-40B4-BE49-F238E27FC236}">
+                <a16:creationId xmlns:a16="http://schemas.microsoft.com/office/drawing/2014/main" id="{B8714555-7486-4DD7-A96C-52C276483584}"/>
+              </a:ext>
+            </a:extLst>
+          </p:cNvPr>
+          <p:cNvPicPr>
+            <a:picLocks noGrp="1" noChangeAspect="1"/>
+          </p:cNvPicPr>
+          <p:nvPr>
+            <p:ph type="pic" sz="quarter" idx="15"/>
+          </p:nvPr>
+        </p:nvPicPr>
+        <p:blipFill rotWithShape="1">
+          <a:blip r:embed="rId4"/>
+          <a:srcRect t="209" b="209"/>
+          <a:stretch/>
+        </p:blipFill>
+        <p:spPr/>
+      </p:pic>
+      <p:sp>
+        <p:nvSpPr>
+          <p:cNvPr id="23" name="Footer Placeholder 22">
+            <a:extLst>
+              <a:ext uri="{FF2B5EF4-FFF2-40B4-BE49-F238E27FC236}">
+                <a16:creationId xmlns:a16="http://schemas.microsoft.com/office/drawing/2014/main" id="{249ACE4E-0038-4BA2-8883-8C3F73B79C44}"/>
+              </a:ext>
+            </a:extLst>
+          </p:cNvPr>
+          <p:cNvSpPr>
+            <a:spLocks noGrp="1"/>
+          </p:cNvSpPr>
+          <p:nvPr>
+            <p:ph type="ftr" sz="quarter" idx="11"/>
           </p:nvPr>
         </p:nvSpPr>
         <p:spPr/>
@@ -11808,48 +11883,18 @@
           <a:lstStyle/>
           <a:p>
             <a:r>
-              <a:rPr lang="en-US"/>
-              <a:t>9/3/20XX</a:t>
-            </a:r>
-            <a:endParaRPr lang="en-US" dirty="0"/>
-          </a:p>
-        </p:txBody>
-      </p:sp>
-      <p:sp>
-        <p:nvSpPr>
-          <p:cNvPr id="5" name="Footer Placeholder 4">
-            <a:extLst>
-              <a:ext uri="{FF2B5EF4-FFF2-40B4-BE49-F238E27FC236}">
-                <a16:creationId xmlns:a16="http://schemas.microsoft.com/office/drawing/2014/main" id="{ABB4030D-F28E-7485-BFAC-58BB57685720}"/>
-              </a:ext>
-            </a:extLst>
-          </p:cNvPr>
-          <p:cNvSpPr>
-            <a:spLocks noGrp="1"/>
-          </p:cNvSpPr>
-          <p:nvPr>
-            <p:ph type="ftr" sz="quarter" idx="11"/>
-          </p:nvPr>
-        </p:nvSpPr>
-        <p:spPr/>
-        <p:txBody>
-          <a:bodyPr/>
-          <a:lstStyle/>
-          <a:p>
-            <a:r>
-              <a:rPr lang="en-US"/>
+              <a:rPr lang="en-US" dirty="0"/>
               <a:t>Presentation Title</a:t>
             </a:r>
-            <a:endParaRPr lang="en-US" dirty="0"/>
-          </a:p>
-        </p:txBody>
-      </p:sp>
-      <p:sp>
-        <p:nvSpPr>
-          <p:cNvPr id="6" name="Slide Number Placeholder 5">
-            <a:extLst>
-              <a:ext uri="{FF2B5EF4-FFF2-40B4-BE49-F238E27FC236}">
-                <a16:creationId xmlns:a16="http://schemas.microsoft.com/office/drawing/2014/main" id="{8384B689-B599-97C7-B6EA-05A31863B469}"/>
+          </a:p>
+        </p:txBody>
+      </p:sp>
+      <p:sp>
+        <p:nvSpPr>
+          <p:cNvPr id="24" name="Slide Number Placeholder 23">
+            <a:extLst>
+              <a:ext uri="{FF2B5EF4-FFF2-40B4-BE49-F238E27FC236}">
+                <a16:creationId xmlns:a16="http://schemas.microsoft.com/office/drawing/2014/main" id="{9A686A52-7630-4675-B383-8C2AD252EC1F}"/>
               </a:ext>
             </a:extLst>
           </p:cNvPr>
@@ -11877,7 +11922,7 @@
     </p:spTree>
     <p:extLst>
       <p:ext uri="{BB962C8B-B14F-4D97-AF65-F5344CB8AC3E}">
-        <p14:creationId xmlns:p14="http://schemas.microsoft.com/office/powerpoint/2010/main" val="1005425126"/>
+        <p14:creationId xmlns:p14="http://schemas.microsoft.com/office/powerpoint/2010/main" val="3584772686"/>
       </p:ext>
     </p:extLst>
   </p:cSld>
@@ -11906,18 +11951,18 @@
       </p:grpSpPr>
       <p:sp>
         <p:nvSpPr>
-          <p:cNvPr id="22" name="Date Placeholder 21">
-            <a:extLst>
-              <a:ext uri="{FF2B5EF4-FFF2-40B4-BE49-F238E27FC236}">
-                <a16:creationId xmlns:a16="http://schemas.microsoft.com/office/drawing/2014/main" id="{692474E6-3035-46B8-9C05-9B4204E8ED39}"/>
-              </a:ext>
-            </a:extLst>
-          </p:cNvPr>
-          <p:cNvSpPr>
-            <a:spLocks noGrp="1"/>
-          </p:cNvSpPr>
-          <p:nvPr>
-            <p:ph type="dt" sz="half" idx="10"/>
+          <p:cNvPr id="2" name="Title 1">
+            <a:extLst>
+              <a:ext uri="{FF2B5EF4-FFF2-40B4-BE49-F238E27FC236}">
+                <a16:creationId xmlns:a16="http://schemas.microsoft.com/office/drawing/2014/main" id="{A95FDEDF-85E7-74CB-9C99-3AC2A8FC5F97}"/>
+              </a:ext>
+            </a:extLst>
+          </p:cNvPr>
+          <p:cNvSpPr>
+            <a:spLocks noGrp="1"/>
+          </p:cNvSpPr>
+          <p:nvPr>
+            <p:ph type="title"/>
           </p:nvPr>
         </p:nvSpPr>
         <p:spPr/>
@@ -11925,16 +11970,124 @@
           <a:bodyPr/>
           <a:lstStyle/>
           <a:p>
+            <a:r>
+              <a:rPr lang="en-US" dirty="0"/>
+              <a:t>Questions/comments?</a:t>
+            </a:r>
+          </a:p>
+        </p:txBody>
+      </p:sp>
+      <p:sp>
+        <p:nvSpPr>
+          <p:cNvPr id="3" name="Content Placeholder 2">
+            <a:extLst>
+              <a:ext uri="{FF2B5EF4-FFF2-40B4-BE49-F238E27FC236}">
+                <a16:creationId xmlns:a16="http://schemas.microsoft.com/office/drawing/2014/main" id="{65F2A567-C017-B347-7085-4A21BE4DAF8B}"/>
+              </a:ext>
+            </a:extLst>
+          </p:cNvPr>
+          <p:cNvSpPr>
+            <a:spLocks noGrp="1"/>
+          </p:cNvSpPr>
+          <p:nvPr>
+            <p:ph idx="1"/>
+          </p:nvPr>
+        </p:nvSpPr>
+        <p:spPr/>
+        <p:txBody>
+          <a:bodyPr/>
+          <a:lstStyle/>
+          <a:p>
+            <a:r>
+              <a:rPr lang="en-US" dirty="0"/>
+              <a:t>Reach me at </a:t>
+            </a:r>
+            <a:r>
+              <a:rPr lang="en-US" dirty="0">
+                <a:hlinkClick r:id="rId2"/>
+              </a:rPr>
+              <a:t>tiluser0@gmail.com</a:t>
+            </a:r>
             <a:endParaRPr lang="en-US" dirty="0"/>
           </a:p>
-        </p:txBody>
-      </p:sp>
-      <p:sp>
-        <p:nvSpPr>
-          <p:cNvPr id="24" name="Slide Number Placeholder 23">
-            <a:extLst>
-              <a:ext uri="{FF2B5EF4-FFF2-40B4-BE49-F238E27FC236}">
-                <a16:creationId xmlns:a16="http://schemas.microsoft.com/office/drawing/2014/main" id="{5D838446-B95D-4AB7-B8CA-D5804BB79A11}"/>
+          <a:p>
+            <a:r>
+              <a:rPr lang="en-US" dirty="0"/>
+              <a:t>Code for demo is available on Github at </a:t>
+            </a:r>
+            <a:r>
+              <a:rPr lang="en-US" dirty="0">
+                <a:hlinkClick r:id="rId3"/>
+              </a:rPr>
+              <a:t>https://github.com/tiluser/cfpy_jn</a:t>
+            </a:r>
+            <a:endParaRPr lang="en-US" dirty="0"/>
+          </a:p>
+        </p:txBody>
+      </p:sp>
+      <p:sp>
+        <p:nvSpPr>
+          <p:cNvPr id="4" name="Date Placeholder 3">
+            <a:extLst>
+              <a:ext uri="{FF2B5EF4-FFF2-40B4-BE49-F238E27FC236}">
+                <a16:creationId xmlns:a16="http://schemas.microsoft.com/office/drawing/2014/main" id="{5BB84B1C-F5D2-D18A-13A4-8E8A5002E005}"/>
+              </a:ext>
+            </a:extLst>
+          </p:cNvPr>
+          <p:cNvSpPr>
+            <a:spLocks noGrp="1"/>
+          </p:cNvSpPr>
+          <p:nvPr>
+            <p:ph type="dt" sz="half" idx="10"/>
+          </p:nvPr>
+        </p:nvSpPr>
+        <p:spPr/>
+        <p:txBody>
+          <a:bodyPr/>
+          <a:lstStyle/>
+          <a:p>
+            <a:r>
+              <a:rPr lang="en-US" dirty="0"/>
+              <a:t>April 2023</a:t>
+            </a:r>
+          </a:p>
+        </p:txBody>
+      </p:sp>
+      <p:sp>
+        <p:nvSpPr>
+          <p:cNvPr id="5" name="Footer Placeholder 4">
+            <a:extLst>
+              <a:ext uri="{FF2B5EF4-FFF2-40B4-BE49-F238E27FC236}">
+                <a16:creationId xmlns:a16="http://schemas.microsoft.com/office/drawing/2014/main" id="{ABB4030D-F28E-7485-BFAC-58BB57685720}"/>
+              </a:ext>
+            </a:extLst>
+          </p:cNvPr>
+          <p:cNvSpPr>
+            <a:spLocks noGrp="1"/>
+          </p:cNvSpPr>
+          <p:nvPr>
+            <p:ph type="ftr" sz="quarter" idx="11"/>
+          </p:nvPr>
+        </p:nvSpPr>
+        <p:spPr/>
+        <p:txBody>
+          <a:bodyPr/>
+          <a:lstStyle/>
+          <a:p>
+            <a:r>
+              <a:rPr lang="en-US"/>
+              <a:t>Presentation Title</a:t>
+            </a:r>
+            <a:endParaRPr lang="en-US" dirty="0"/>
+          </a:p>
+        </p:txBody>
+      </p:sp>
+      <p:sp>
+        <p:nvSpPr>
+          <p:cNvPr id="6" name="Slide Number Placeholder 5">
+            <a:extLst>
+              <a:ext uri="{FF2B5EF4-FFF2-40B4-BE49-F238E27FC236}">
+                <a16:creationId xmlns:a16="http://schemas.microsoft.com/office/drawing/2014/main" id="{8384B689-B599-97C7-B6EA-05A31863B469}"/>
               </a:ext>
             </a:extLst>
           </p:cNvPr>
@@ -11954,6 +12107,91 @@
               <a:rPr lang="en-US" smtClean="0"/>
               <a:pPr/>
               <a:t>13</a:t>
+            </a:fld>
+            <a:endParaRPr lang="en-US" dirty="0"/>
+          </a:p>
+        </p:txBody>
+      </p:sp>
+    </p:spTree>
+    <p:extLst>
+      <p:ext uri="{BB962C8B-B14F-4D97-AF65-F5344CB8AC3E}">
+        <p14:creationId xmlns:p14="http://schemas.microsoft.com/office/powerpoint/2010/main" val="1005425126"/>
+      </p:ext>
+    </p:extLst>
+  </p:cSld>
+  <p:clrMapOvr>
+    <a:masterClrMapping/>
+  </p:clrMapOvr>
+</p:sld>
+</file>
+
+<file path=ppt/slides/slide14.xml><?xml version="1.0" encoding="utf-8"?>
+<p:sld xmlns:a="http://schemas.openxmlformats.org/drawingml/2006/main" xmlns:r="http://schemas.openxmlformats.org/officeDocument/2006/relationships" xmlns:p="http://schemas.openxmlformats.org/presentationml/2006/main">
+  <p:cSld>
+    <p:spTree>
+      <p:nvGrpSpPr>
+        <p:cNvPr id="1" name=""/>
+        <p:cNvGrpSpPr/>
+        <p:nvPr/>
+      </p:nvGrpSpPr>
+      <p:grpSpPr>
+        <a:xfrm>
+          <a:off x="0" y="0"/>
+          <a:ext cx="0" cy="0"/>
+          <a:chOff x="0" y="0"/>
+          <a:chExt cx="0" cy="0"/>
+        </a:xfrm>
+      </p:grpSpPr>
+      <p:sp>
+        <p:nvSpPr>
+          <p:cNvPr id="22" name="Date Placeholder 21">
+            <a:extLst>
+              <a:ext uri="{FF2B5EF4-FFF2-40B4-BE49-F238E27FC236}">
+                <a16:creationId xmlns:a16="http://schemas.microsoft.com/office/drawing/2014/main" id="{692474E6-3035-46B8-9C05-9B4204E8ED39}"/>
+              </a:ext>
+            </a:extLst>
+          </p:cNvPr>
+          <p:cNvSpPr>
+            <a:spLocks noGrp="1"/>
+          </p:cNvSpPr>
+          <p:nvPr>
+            <p:ph type="dt" sz="half" idx="10"/>
+          </p:nvPr>
+        </p:nvSpPr>
+        <p:spPr/>
+        <p:txBody>
+          <a:bodyPr/>
+          <a:lstStyle/>
+          <a:p>
+            <a:endParaRPr lang="en-US" dirty="0"/>
+          </a:p>
+        </p:txBody>
+      </p:sp>
+      <p:sp>
+        <p:nvSpPr>
+          <p:cNvPr id="24" name="Slide Number Placeholder 23">
+            <a:extLst>
+              <a:ext uri="{FF2B5EF4-FFF2-40B4-BE49-F238E27FC236}">
+                <a16:creationId xmlns:a16="http://schemas.microsoft.com/office/drawing/2014/main" id="{5D838446-B95D-4AB7-B8CA-D5804BB79A11}"/>
+              </a:ext>
+            </a:extLst>
+          </p:cNvPr>
+          <p:cNvSpPr>
+            <a:spLocks noGrp="1"/>
+          </p:cNvSpPr>
+          <p:nvPr>
+            <p:ph type="sldNum" sz="quarter" idx="12"/>
+          </p:nvPr>
+        </p:nvSpPr>
+        <p:spPr/>
+        <p:txBody>
+          <a:bodyPr/>
+          <a:lstStyle/>
+          <a:p>
+            <a:fld id="{D8DA9DAA-006C-4F4B-980E-E3DF019B24E2}" type="slidenum">
+              <a:rPr lang="en-US" smtClean="0"/>
+              <a:pPr/>
+              <a:t>14</a:t>
             </a:fld>
             <a:endParaRPr lang="en-US" dirty="0"/>
           </a:p>
@@ -12234,13 +12472,13 @@
           <a:p>
             <a:r>
               <a:rPr lang="en-US" dirty="0"/>
-              <a:t>Has easy access to programming languages such as Python, R, and Julia with lots of built-in tools for that purpose.</a:t>
+              <a:t>Supported in many different programming languages. Commonly Python, R, and Julia are used.</a:t>
             </a:r>
           </a:p>
           <a:p>
             <a:r>
               <a:rPr lang="en-US" dirty="0"/>
-              <a:t>For this demo, we’ll be using a version of Forth built on top of Python – Creole Forth for Python.</a:t>
+              <a:t>Has lots of built-in tools.</a:t>
             </a:r>
           </a:p>
         </p:txBody>
@@ -12331,7 +12569,7 @@
     </p:spTree>
     <p:extLst>
       <p:ext uri="{BB962C8B-B14F-4D97-AF65-F5344CB8AC3E}">
-        <p14:creationId xmlns:p14="http://schemas.microsoft.com/office/powerpoint/2010/main" val="3637438110"/>
+        <p14:creationId xmlns:p14="http://schemas.microsoft.com/office/powerpoint/2010/main" val="1338435609"/>
       </p:ext>
     </p:extLst>
   </p:cSld>
@@ -12381,7 +12619,7 @@
           <a:p>
             <a:r>
               <a:rPr lang="en-US" dirty="0"/>
-              <a:t>Initial setup</a:t>
+              <a:t>Is forth supported?</a:t>
             </a:r>
           </a:p>
         </p:txBody>
@@ -12409,37 +12647,25 @@
           <a:p>
             <a:r>
               <a:rPr lang="en-US" dirty="0"/>
-              <a:t>Import Creole Forth for Python along with two helper definitions to execute and compile the Forth code. </a:t>
+              <a:t>Not directly, but Python is.</a:t>
             </a:r>
           </a:p>
           <a:p>
             <a:r>
               <a:rPr lang="en-US" dirty="0"/>
-              <a:t>Examples:</a:t>
+              <a:t>That means a Python written in Forth can work.</a:t>
             </a:r>
           </a:p>
           <a:p>
             <a:r>
               <a:rPr lang="en-US" dirty="0"/>
-              <a:t>(1) execCF(‘HELLO’) – executes the ‘HELLO’ primitive.</a:t>
+              <a:t>Fortunately, I’ve written a version for Python.</a:t>
             </a:r>
           </a:p>
           <a:p>
             <a:r>
               <a:rPr lang="en-US" dirty="0"/>
-              <a:t>(2) execCF(‘TEST’) – executes the ‘TEST’ primitive.</a:t>
-            </a:r>
-          </a:p>
-          <a:p>
-            <a:r>
-              <a:rPr lang="en-US" dirty="0"/>
-              <a:t>(3) execCF(‘3 4 + .’) – adds two numbers, prints the result. </a:t>
-            </a:r>
-          </a:p>
-          <a:p>
-            <a:r>
-              <a:rPr lang="en-US"/>
-              <a:t>(4) execCF(‘VLIST’) – lists the dictionary definitions.</a:t>
+              <a:t>We’ll be taking a look at how it can be used with Jupyter notebook today. </a:t>
             </a:r>
           </a:p>
           <a:p>
@@ -12533,7 +12759,7 @@
     </p:spTree>
     <p:extLst>
       <p:ext uri="{BB962C8B-B14F-4D97-AF65-F5344CB8AC3E}">
-        <p14:creationId xmlns:p14="http://schemas.microsoft.com/office/powerpoint/2010/main" val="3890913174"/>
+        <p14:creationId xmlns:p14="http://schemas.microsoft.com/office/powerpoint/2010/main" val="3637438110"/>
       </p:ext>
     </p:extLst>
   </p:cSld>
@@ -12578,49 +12804,74 @@
         </p:nvSpPr>
         <p:spPr/>
         <p:txBody>
-          <a:bodyPr>
-            <a:normAutofit fontScale="90000"/>
-          </a:bodyPr>
-          <a:lstStyle/>
-          <a:p>
-            <a:r>
-              <a:rPr lang="en-US" dirty="0"/>
-              <a:t>Limitations to this approach</a:t>
-            </a:r>
-          </a:p>
-        </p:txBody>
-      </p:sp>
-      <p:sp>
-        <p:nvSpPr>
-          <p:cNvPr id="3" name="Content Placeholder 2">
-            <a:extLst>
-              <a:ext uri="{FF2B5EF4-FFF2-40B4-BE49-F238E27FC236}">
-                <a16:creationId xmlns:a16="http://schemas.microsoft.com/office/drawing/2014/main" id="{F9FF31C3-9AE1-BF56-DFC8-6756C7A7ED70}"/>
-              </a:ext>
-            </a:extLst>
-          </p:cNvPr>
-          <p:cNvSpPr>
-            <a:spLocks noGrp="1"/>
-          </p:cNvSpPr>
-          <p:nvPr>
-            <p:ph idx="1"/>
-          </p:nvPr>
-        </p:nvSpPr>
-        <p:spPr/>
-        <p:txBody>
           <a:bodyPr/>
           <a:lstStyle/>
           <a:p>
             <a:r>
               <a:rPr lang="en-US" dirty="0"/>
-              <a:t>Wrapping Forth code inside a Python function is cumbersome. </a:t>
-            </a:r>
-          </a:p>
+              <a:t>Initial setup</a:t>
+            </a:r>
+          </a:p>
+        </p:txBody>
+      </p:sp>
+      <p:sp>
+        <p:nvSpPr>
+          <p:cNvPr id="3" name="Content Placeholder 2">
+            <a:extLst>
+              <a:ext uri="{FF2B5EF4-FFF2-40B4-BE49-F238E27FC236}">
+                <a16:creationId xmlns:a16="http://schemas.microsoft.com/office/drawing/2014/main" id="{F9FF31C3-9AE1-BF56-DFC8-6756C7A7ED70}"/>
+              </a:ext>
+            </a:extLst>
+          </p:cNvPr>
+          <p:cNvSpPr>
+            <a:spLocks noGrp="1"/>
+          </p:cNvSpPr>
+          <p:nvPr>
+            <p:ph idx="1"/>
+          </p:nvPr>
+        </p:nvSpPr>
+        <p:spPr/>
+        <p:txBody>
+          <a:bodyPr/>
+          <a:lstStyle/>
           <a:p>
             <a:r>
               <a:rPr lang="en-US" dirty="0"/>
-              <a:t>It would be nice to do it more conveniently.</a:t>
-            </a:r>
+              <a:t>Import Creole Forth for Python along with two helper definitions to execute and compile the Forth code. </a:t>
+            </a:r>
+          </a:p>
+          <a:p>
+            <a:r>
+              <a:rPr lang="en-US" dirty="0"/>
+              <a:t>Examples:</a:t>
+            </a:r>
+          </a:p>
+          <a:p>
+            <a:r>
+              <a:rPr lang="en-US" dirty="0"/>
+              <a:t>(1) execCF(‘HELLO’) – executes the ‘HELLO’ primitive.</a:t>
+            </a:r>
+          </a:p>
+          <a:p>
+            <a:r>
+              <a:rPr lang="en-US" dirty="0"/>
+              <a:t>(2) execCF(‘TEST’) – executes the ‘TEST’ primitive.</a:t>
+            </a:r>
+          </a:p>
+          <a:p>
+            <a:r>
+              <a:rPr lang="en-US" dirty="0"/>
+              <a:t>(3) execCF(‘3 4 + .’) – adds two numbers, prints the result. </a:t>
+            </a:r>
+          </a:p>
+          <a:p>
+            <a:r>
+              <a:rPr lang="en-US" dirty="0"/>
+              <a:t>(4) execCF(‘VLIST’) – lists the dictionary definitions.</a:t>
+            </a:r>
+          </a:p>
+          <a:p>
+            <a:endParaRPr lang="en-US" dirty="0"/>
           </a:p>
         </p:txBody>
       </p:sp>
@@ -12710,7 +12961,7 @@
     </p:spTree>
     <p:extLst>
       <p:ext uri="{BB962C8B-B14F-4D97-AF65-F5344CB8AC3E}">
-        <p14:creationId xmlns:p14="http://schemas.microsoft.com/office/powerpoint/2010/main" val="1799408102"/>
+        <p14:creationId xmlns:p14="http://schemas.microsoft.com/office/powerpoint/2010/main" val="3890913174"/>
       </p:ext>
     </p:extLst>
   </p:cSld>
@@ -12739,18 +12990,48 @@
       </p:grpSpPr>
       <p:sp>
         <p:nvSpPr>
-          <p:cNvPr id="5" name="Footer Placeholder 4">
-            <a:extLst>
-              <a:ext uri="{FF2B5EF4-FFF2-40B4-BE49-F238E27FC236}">
-                <a16:creationId xmlns:a16="http://schemas.microsoft.com/office/drawing/2014/main" id="{6A2B03AA-3DFE-5353-9676-5B5C1FED25E8}"/>
-              </a:ext>
-            </a:extLst>
-          </p:cNvPr>
-          <p:cNvSpPr>
-            <a:spLocks noGrp="1"/>
-          </p:cNvSpPr>
-          <p:nvPr>
-            <p:ph type="ftr" sz="quarter" idx="11"/>
+          <p:cNvPr id="2" name="Title 1">
+            <a:extLst>
+              <a:ext uri="{FF2B5EF4-FFF2-40B4-BE49-F238E27FC236}">
+                <a16:creationId xmlns:a16="http://schemas.microsoft.com/office/drawing/2014/main" id="{B4FE510C-9C70-CE01-3581-B564620B5F29}"/>
+              </a:ext>
+            </a:extLst>
+          </p:cNvPr>
+          <p:cNvSpPr>
+            <a:spLocks noGrp="1"/>
+          </p:cNvSpPr>
+          <p:nvPr>
+            <p:ph type="title"/>
+          </p:nvPr>
+        </p:nvSpPr>
+        <p:spPr/>
+        <p:txBody>
+          <a:bodyPr>
+            <a:normAutofit fontScale="90000"/>
+          </a:bodyPr>
+          <a:lstStyle/>
+          <a:p>
+            <a:r>
+              <a:rPr lang="en-US" dirty="0"/>
+              <a:t>Limitations to this approach</a:t>
+            </a:r>
+          </a:p>
+        </p:txBody>
+      </p:sp>
+      <p:sp>
+        <p:nvSpPr>
+          <p:cNvPr id="3" name="Content Placeholder 2">
+            <a:extLst>
+              <a:ext uri="{FF2B5EF4-FFF2-40B4-BE49-F238E27FC236}">
+                <a16:creationId xmlns:a16="http://schemas.microsoft.com/office/drawing/2014/main" id="{F9FF31C3-9AE1-BF56-DFC8-6756C7A7ED70}"/>
+              </a:ext>
+            </a:extLst>
+          </p:cNvPr>
+          <p:cNvSpPr>
+            <a:spLocks noGrp="1"/>
+          </p:cNvSpPr>
+          <p:nvPr>
+            <p:ph idx="1"/>
           </p:nvPr>
         </p:nvSpPr>
         <p:spPr/>
@@ -12758,54 +13039,33 @@
           <a:bodyPr/>
           <a:lstStyle/>
           <a:p>
-            <a:endParaRPr lang="en-US" dirty="0"/>
-          </a:p>
-        </p:txBody>
-      </p:sp>
-      <p:sp>
-        <p:nvSpPr>
-          <p:cNvPr id="2" name="Title 1">
-            <a:extLst>
-              <a:ext uri="{FF2B5EF4-FFF2-40B4-BE49-F238E27FC236}">
-                <a16:creationId xmlns:a16="http://schemas.microsoft.com/office/drawing/2014/main" id="{B4FE510C-9C70-CE01-3581-B564620B5F29}"/>
-              </a:ext>
-            </a:extLst>
-          </p:cNvPr>
-          <p:cNvSpPr>
-            <a:spLocks noGrp="1"/>
-          </p:cNvSpPr>
-          <p:nvPr>
-            <p:ph type="title"/>
-          </p:nvPr>
-        </p:nvSpPr>
-        <p:spPr/>
-        <p:txBody>
-          <a:bodyPr>
-            <a:normAutofit/>
-          </a:bodyPr>
-          <a:lstStyle/>
-          <a:p>
             <a:r>
               <a:rPr lang="en-US" dirty="0"/>
-              <a:t>One alternative</a:t>
-            </a:r>
-          </a:p>
-        </p:txBody>
-      </p:sp>
-      <p:sp>
-        <p:nvSpPr>
-          <p:cNvPr id="3" name="Content Placeholder 2">
-            <a:extLst>
-              <a:ext uri="{FF2B5EF4-FFF2-40B4-BE49-F238E27FC236}">
-                <a16:creationId xmlns:a16="http://schemas.microsoft.com/office/drawing/2014/main" id="{F9FF31C3-9AE1-BF56-DFC8-6756C7A7ED70}"/>
-              </a:ext>
-            </a:extLst>
-          </p:cNvPr>
-          <p:cNvSpPr>
-            <a:spLocks noGrp="1"/>
-          </p:cNvSpPr>
-          <p:nvPr>
-            <p:ph idx="1"/>
+              <a:t>Wrapping Forth code inside a Python function is cumbersome. </a:t>
+            </a:r>
+          </a:p>
+          <a:p>
+            <a:r>
+              <a:rPr lang="en-US" dirty="0"/>
+              <a:t>It would be nice to do it more conveniently.</a:t>
+            </a:r>
+          </a:p>
+        </p:txBody>
+      </p:sp>
+      <p:sp>
+        <p:nvSpPr>
+          <p:cNvPr id="4" name="Date Placeholder 3">
+            <a:extLst>
+              <a:ext uri="{FF2B5EF4-FFF2-40B4-BE49-F238E27FC236}">
+                <a16:creationId xmlns:a16="http://schemas.microsoft.com/office/drawing/2014/main" id="{4B883437-89E9-F103-64A5-BECC381BD95B}"/>
+              </a:ext>
+            </a:extLst>
+          </p:cNvPr>
+          <p:cNvSpPr>
+            <a:spLocks noGrp="1"/>
+          </p:cNvSpPr>
+          <p:nvPr>
+            <p:ph type="dt" sz="half" idx="10"/>
           </p:nvPr>
         </p:nvSpPr>
         <p:spPr/>
@@ -12815,45 +13075,25 @@
           <a:p>
             <a:r>
               <a:rPr lang="en-US" dirty="0"/>
-              <a:t>Create your own Jupyter notebook kernel. </a:t>
-            </a:r>
-          </a:p>
-          <a:p>
-            <a:r>
-              <a:rPr lang="en-US" dirty="0"/>
-              <a:t>There are tools available such as </a:t>
-            </a:r>
-            <a:r>
-              <a:rPr lang="en-US" dirty="0" err="1"/>
-              <a:t>Xeus</a:t>
-            </a:r>
-            <a:r>
-              <a:rPr lang="en-US" dirty="0"/>
-              <a:t> which are designed for this.</a:t>
-            </a:r>
-          </a:p>
-          <a:p>
-            <a:r>
-              <a:rPr lang="en-US" dirty="0"/>
-              <a:t>It’s still a fair amount of work. </a:t>
-            </a:r>
-          </a:p>
-        </p:txBody>
-      </p:sp>
-      <p:sp>
-        <p:nvSpPr>
-          <p:cNvPr id="4" name="Date Placeholder 3">
-            <a:extLst>
-              <a:ext uri="{FF2B5EF4-FFF2-40B4-BE49-F238E27FC236}">
-                <a16:creationId xmlns:a16="http://schemas.microsoft.com/office/drawing/2014/main" id="{4B883437-89E9-F103-64A5-BECC381BD95B}"/>
-              </a:ext>
-            </a:extLst>
-          </p:cNvPr>
-          <p:cNvSpPr>
-            <a:spLocks noGrp="1"/>
-          </p:cNvSpPr>
-          <p:nvPr>
-            <p:ph type="dt" sz="half" idx="10"/>
+              <a:t>April 2023</a:t>
+            </a:r>
+          </a:p>
+        </p:txBody>
+      </p:sp>
+      <p:sp>
+        <p:nvSpPr>
+          <p:cNvPr id="5" name="Footer Placeholder 4">
+            <a:extLst>
+              <a:ext uri="{FF2B5EF4-FFF2-40B4-BE49-F238E27FC236}">
+                <a16:creationId xmlns:a16="http://schemas.microsoft.com/office/drawing/2014/main" id="{6A2B03AA-3DFE-5353-9676-5B5C1FED25E8}"/>
+              </a:ext>
+            </a:extLst>
+          </p:cNvPr>
+          <p:cNvSpPr>
+            <a:spLocks noGrp="1"/>
+          </p:cNvSpPr>
+          <p:nvPr>
+            <p:ph type="ftr" sz="quarter" idx="11"/>
           </p:nvPr>
         </p:nvSpPr>
         <p:spPr/>
@@ -12861,10 +13101,7 @@
           <a:bodyPr/>
           <a:lstStyle/>
           <a:p>
-            <a:r>
-              <a:rPr lang="en-US" dirty="0"/>
-              <a:t>April 2023</a:t>
-            </a:r>
+            <a:endParaRPr lang="en-US" dirty="0"/>
           </a:p>
         </p:txBody>
       </p:sp>
@@ -12901,7 +13138,7 @@
     </p:spTree>
     <p:extLst>
       <p:ext uri="{BB962C8B-B14F-4D97-AF65-F5344CB8AC3E}">
-        <p14:creationId xmlns:p14="http://schemas.microsoft.com/office/powerpoint/2010/main" val="3164623787"/>
+        <p14:creationId xmlns:p14="http://schemas.microsoft.com/office/powerpoint/2010/main" val="1799408102"/>
       </p:ext>
     </p:extLst>
   </p:cSld>
@@ -12930,6 +13167,31 @@
       </p:grpSpPr>
       <p:sp>
         <p:nvSpPr>
+          <p:cNvPr id="5" name="Footer Placeholder 4">
+            <a:extLst>
+              <a:ext uri="{FF2B5EF4-FFF2-40B4-BE49-F238E27FC236}">
+                <a16:creationId xmlns:a16="http://schemas.microsoft.com/office/drawing/2014/main" id="{6A2B03AA-3DFE-5353-9676-5B5C1FED25E8}"/>
+              </a:ext>
+            </a:extLst>
+          </p:cNvPr>
+          <p:cNvSpPr>
+            <a:spLocks noGrp="1"/>
+          </p:cNvSpPr>
+          <p:nvPr>
+            <p:ph type="ftr" sz="quarter" idx="11"/>
+          </p:nvPr>
+        </p:nvSpPr>
+        <p:spPr/>
+        <p:txBody>
+          <a:bodyPr/>
+          <a:lstStyle/>
+          <a:p>
+            <a:endParaRPr lang="en-US" dirty="0"/>
+          </a:p>
+        </p:txBody>
+      </p:sp>
+      <p:sp>
+        <p:nvSpPr>
           <p:cNvPr id="2" name="Title 1">
             <a:extLst>
               <a:ext uri="{FF2B5EF4-FFF2-40B4-BE49-F238E27FC236}">
@@ -12953,7 +13215,7 @@
           <a:p>
             <a:r>
               <a:rPr lang="en-US" dirty="0"/>
-              <a:t>A simpler solution</a:t>
+              <a:t>One alternative</a:t>
             </a:r>
           </a:p>
         </p:txBody>
@@ -12981,19 +13243,19 @@
           <a:p>
             <a:r>
               <a:rPr lang="en-US" dirty="0"/>
-              <a:t>Stick with the Python kernel. </a:t>
+              <a:t>Create your own Jupyter notebook kernel. </a:t>
             </a:r>
           </a:p>
           <a:p>
             <a:r>
               <a:rPr lang="en-US" dirty="0"/>
-              <a:t>Python has a facility called magic commands, which allow the user to wrap a line or a cell inside a function and then call the function. </a:t>
+              <a:t>There are tools available such as Xeus which are designed for this.</a:t>
             </a:r>
           </a:p>
           <a:p>
             <a:r>
               <a:rPr lang="en-US" dirty="0"/>
-              <a:t>It only requires writing a few lines of code. </a:t>
+              <a:t>It’s still a fair amount of work. </a:t>
             </a:r>
           </a:p>
         </p:txBody>
@@ -13023,31 +13285,6 @@
               <a:rPr lang="en-US" dirty="0"/>
               <a:t>April 2023</a:t>
             </a:r>
-          </a:p>
-        </p:txBody>
-      </p:sp>
-      <p:sp>
-        <p:nvSpPr>
-          <p:cNvPr id="5" name="Footer Placeholder 4">
-            <a:extLst>
-              <a:ext uri="{FF2B5EF4-FFF2-40B4-BE49-F238E27FC236}">
-                <a16:creationId xmlns:a16="http://schemas.microsoft.com/office/drawing/2014/main" id="{6A2B03AA-3DFE-5353-9676-5B5C1FED25E8}"/>
-              </a:ext>
-            </a:extLst>
-          </p:cNvPr>
-          <p:cNvSpPr>
-            <a:spLocks noGrp="1"/>
-          </p:cNvSpPr>
-          <p:nvPr>
-            <p:ph type="ftr" sz="quarter" idx="11"/>
-          </p:nvPr>
-        </p:nvSpPr>
-        <p:spPr/>
-        <p:txBody>
-          <a:bodyPr/>
-          <a:lstStyle/>
-          <a:p>
-            <a:endParaRPr lang="en-US" dirty="0"/>
           </a:p>
         </p:txBody>
       </p:sp>
@@ -13084,7 +13321,7 @@
     </p:spTree>
     <p:extLst>
       <p:ext uri="{BB962C8B-B14F-4D97-AF65-F5344CB8AC3E}">
-        <p14:creationId xmlns:p14="http://schemas.microsoft.com/office/powerpoint/2010/main" val="3196131547"/>
+        <p14:creationId xmlns:p14="http://schemas.microsoft.com/office/powerpoint/2010/main" val="3164623787"/>
       </p:ext>
     </p:extLst>
   </p:cSld>
@@ -13116,7 +13353,7 @@
           <p:cNvPr id="2" name="Title 1">
             <a:extLst>
               <a:ext uri="{FF2B5EF4-FFF2-40B4-BE49-F238E27FC236}">
-                <a16:creationId xmlns:a16="http://schemas.microsoft.com/office/drawing/2014/main" id="{8AA0A4AB-1AE0-30F8-A6C7-60AA411ED917}"/>
+                <a16:creationId xmlns:a16="http://schemas.microsoft.com/office/drawing/2014/main" id="{B4FE510C-9C70-CE01-3581-B564620B5F29}"/>
               </a:ext>
             </a:extLst>
           </p:cNvPr>
@@ -13125,6 +13362,36 @@
           </p:cNvSpPr>
           <p:nvPr>
             <p:ph type="title"/>
+          </p:nvPr>
+        </p:nvSpPr>
+        <p:spPr/>
+        <p:txBody>
+          <a:bodyPr>
+            <a:normAutofit/>
+          </a:bodyPr>
+          <a:lstStyle/>
+          <a:p>
+            <a:r>
+              <a:rPr lang="en-US" dirty="0"/>
+              <a:t>A simpler solution</a:t>
+            </a:r>
+          </a:p>
+        </p:txBody>
+      </p:sp>
+      <p:sp>
+        <p:nvSpPr>
+          <p:cNvPr id="3" name="Content Placeholder 2">
+            <a:extLst>
+              <a:ext uri="{FF2B5EF4-FFF2-40B4-BE49-F238E27FC236}">
+                <a16:creationId xmlns:a16="http://schemas.microsoft.com/office/drawing/2014/main" id="{F9FF31C3-9AE1-BF56-DFC8-6756C7A7ED70}"/>
+              </a:ext>
+            </a:extLst>
+          </p:cNvPr>
+          <p:cNvSpPr>
+            <a:spLocks noGrp="1"/>
+          </p:cNvSpPr>
+          <p:nvPr>
+            <p:ph idx="1"/>
           </p:nvPr>
         </p:nvSpPr>
         <p:spPr/>
@@ -13134,25 +13401,37 @@
           <a:p>
             <a:r>
               <a:rPr lang="en-US" dirty="0"/>
-              <a:t>The magic commands</a:t>
-            </a:r>
-          </a:p>
-        </p:txBody>
-      </p:sp>
-      <p:sp>
-        <p:nvSpPr>
-          <p:cNvPr id="3" name="Content Placeholder 2">
-            <a:extLst>
-              <a:ext uri="{FF2B5EF4-FFF2-40B4-BE49-F238E27FC236}">
-                <a16:creationId xmlns:a16="http://schemas.microsoft.com/office/drawing/2014/main" id="{FD8781C5-E080-7B14-FA1C-5E5E542C801A}"/>
-              </a:ext>
-            </a:extLst>
-          </p:cNvPr>
-          <p:cNvSpPr>
-            <a:spLocks noGrp="1"/>
-          </p:cNvSpPr>
-          <p:nvPr>
-            <p:ph idx="1"/>
+              <a:t>Stick with the Python kernel. </a:t>
+            </a:r>
+          </a:p>
+          <a:p>
+            <a:r>
+              <a:rPr lang="en-US" dirty="0"/>
+              <a:t>Python has a facility called magic commands, which allow the user to wrap a line or a cell inside a function and then call the function. </a:t>
+            </a:r>
+          </a:p>
+          <a:p>
+            <a:r>
+              <a:rPr lang="en-US" dirty="0"/>
+              <a:t>It only requires writing a few lines of code. </a:t>
+            </a:r>
+          </a:p>
+        </p:txBody>
+      </p:sp>
+      <p:sp>
+        <p:nvSpPr>
+          <p:cNvPr id="4" name="Date Placeholder 3">
+            <a:extLst>
+              <a:ext uri="{FF2B5EF4-FFF2-40B4-BE49-F238E27FC236}">
+                <a16:creationId xmlns:a16="http://schemas.microsoft.com/office/drawing/2014/main" id="{4B883437-89E9-F103-64A5-BECC381BD95B}"/>
+              </a:ext>
+            </a:extLst>
+          </p:cNvPr>
+          <p:cNvSpPr>
+            <a:spLocks noGrp="1"/>
+          </p:cNvSpPr>
+          <p:nvPr>
+            <p:ph type="dt" sz="half" idx="10"/>
           </p:nvPr>
         </p:nvSpPr>
         <p:spPr/>
@@ -13162,43 +13441,25 @@
           <a:p>
             <a:r>
               <a:rPr lang="en-US" dirty="0"/>
-              <a:t>%cfpy – executes Forth commands on a single line.</a:t>
-            </a:r>
-          </a:p>
-          <a:p>
-            <a:r>
-              <a:rPr lang="en-US" dirty="0"/>
-              <a:t>%%cfpy – executes Forth commands in a cell.</a:t>
-            </a:r>
-          </a:p>
-          <a:p>
-            <a:r>
-              <a:rPr lang="en-US" dirty="0"/>
-              <a:t>%compdef – compiles Forth on a single line.</a:t>
-            </a:r>
-          </a:p>
-          <a:p>
-            <a:r>
-              <a:rPr lang="en-US" dirty="0"/>
-              <a:t>%%compdef – compiles Forth in a cell. </a:t>
-            </a:r>
-          </a:p>
-        </p:txBody>
-      </p:sp>
-      <p:sp>
-        <p:nvSpPr>
-          <p:cNvPr id="4" name="Date Placeholder 3">
-            <a:extLst>
-              <a:ext uri="{FF2B5EF4-FFF2-40B4-BE49-F238E27FC236}">
-                <a16:creationId xmlns:a16="http://schemas.microsoft.com/office/drawing/2014/main" id="{6F12FB65-2BA5-5A57-A941-D6820CDFB6CA}"/>
-              </a:ext>
-            </a:extLst>
-          </p:cNvPr>
-          <p:cNvSpPr>
-            <a:spLocks noGrp="1"/>
-          </p:cNvSpPr>
-          <p:nvPr>
-            <p:ph type="dt" sz="half" idx="10"/>
+              <a:t>April 2023</a:t>
+            </a:r>
+          </a:p>
+        </p:txBody>
+      </p:sp>
+      <p:sp>
+        <p:nvSpPr>
+          <p:cNvPr id="5" name="Footer Placeholder 4">
+            <a:extLst>
+              <a:ext uri="{FF2B5EF4-FFF2-40B4-BE49-F238E27FC236}">
+                <a16:creationId xmlns:a16="http://schemas.microsoft.com/office/drawing/2014/main" id="{6A2B03AA-3DFE-5353-9676-5B5C1FED25E8}"/>
+              </a:ext>
+            </a:extLst>
+          </p:cNvPr>
+          <p:cNvSpPr>
+            <a:spLocks noGrp="1"/>
+          </p:cNvSpPr>
+          <p:nvPr>
+            <p:ph type="ftr" sz="quarter" idx="11"/>
           </p:nvPr>
         </p:nvSpPr>
         <p:spPr/>
@@ -13206,38 +13467,6 @@
           <a:bodyPr/>
           <a:lstStyle/>
           <a:p>
-            <a:r>
-              <a:rPr lang="en-US" dirty="0"/>
-              <a:t>April 2023</a:t>
-            </a:r>
-          </a:p>
-        </p:txBody>
-      </p:sp>
-      <p:sp>
-        <p:nvSpPr>
-          <p:cNvPr id="5" name="Footer Placeholder 4">
-            <a:extLst>
-              <a:ext uri="{FF2B5EF4-FFF2-40B4-BE49-F238E27FC236}">
-                <a16:creationId xmlns:a16="http://schemas.microsoft.com/office/drawing/2014/main" id="{1515BC2D-0C20-1E19-D645-57A9133AE5A4}"/>
-              </a:ext>
-            </a:extLst>
-          </p:cNvPr>
-          <p:cNvSpPr>
-            <a:spLocks noGrp="1"/>
-          </p:cNvSpPr>
-          <p:nvPr>
-            <p:ph type="ftr" sz="quarter" idx="11"/>
-          </p:nvPr>
-        </p:nvSpPr>
-        <p:spPr/>
-        <p:txBody>
-          <a:bodyPr/>
-          <a:lstStyle/>
-          <a:p>
-            <a:r>
-              <a:rPr lang="en-US"/>
-              <a:t>Presentation Title</a:t>
-            </a:r>
             <a:endParaRPr lang="en-US" dirty="0"/>
           </a:p>
         </p:txBody>
@@ -13247,7 +13476,7 @@
           <p:cNvPr id="6" name="Slide Number Placeholder 5">
             <a:extLst>
               <a:ext uri="{FF2B5EF4-FFF2-40B4-BE49-F238E27FC236}">
-                <a16:creationId xmlns:a16="http://schemas.microsoft.com/office/drawing/2014/main" id="{65CA92FC-A5A3-ABEB-8A40-82C6A7114F27}"/>
+                <a16:creationId xmlns:a16="http://schemas.microsoft.com/office/drawing/2014/main" id="{BD369CE7-201D-A286-14D2-71AE30ED1063}"/>
               </a:ext>
             </a:extLst>
           </p:cNvPr>
@@ -13275,7 +13504,7 @@
     </p:spTree>
     <p:extLst>
       <p:ext uri="{BB962C8B-B14F-4D97-AF65-F5344CB8AC3E}">
-        <p14:creationId xmlns:p14="http://schemas.microsoft.com/office/powerpoint/2010/main" val="58144141"/>
+        <p14:creationId xmlns:p14="http://schemas.microsoft.com/office/powerpoint/2010/main" val="3196131547"/>
       </p:ext>
     </p:extLst>
   </p:cSld>
@@ -13307,7 +13536,7 @@
           <p:cNvPr id="2" name="Title 1">
             <a:extLst>
               <a:ext uri="{FF2B5EF4-FFF2-40B4-BE49-F238E27FC236}">
-                <a16:creationId xmlns:a16="http://schemas.microsoft.com/office/drawing/2014/main" id="{B43260D8-B7EA-C4D0-58BB-BE04086922D6}"/>
+                <a16:creationId xmlns:a16="http://schemas.microsoft.com/office/drawing/2014/main" id="{8AA0A4AB-1AE0-30F8-A6C7-60AA411ED917}"/>
               </a:ext>
             </a:extLst>
           </p:cNvPr>
@@ -13325,7 +13554,7 @@
           <a:p>
             <a:r>
               <a:rPr lang="en-US" dirty="0"/>
-              <a:t>Some simple Examples</a:t>
+              <a:t>The magic commands</a:t>
             </a:r>
           </a:p>
         </p:txBody>
@@ -13335,7 +13564,7 @@
           <p:cNvPr id="3" name="Content Placeholder 2">
             <a:extLst>
               <a:ext uri="{FF2B5EF4-FFF2-40B4-BE49-F238E27FC236}">
-                <a16:creationId xmlns:a16="http://schemas.microsoft.com/office/drawing/2014/main" id="{E947289B-D921-8279-E887-4ACBA1FF66A5}"/>
+                <a16:creationId xmlns:a16="http://schemas.microsoft.com/office/drawing/2014/main" id="{FD8781C5-E080-7B14-FA1C-5E5E542C801A}"/>
               </a:ext>
             </a:extLst>
           </p:cNvPr>
@@ -13353,51 +13582,25 @@
           <a:p>
             <a:r>
               <a:rPr lang="en-US" dirty="0"/>
-              <a:t>%cfpy HELLO – Executes the HELLO primitive</a:t>
+              <a:t>%cfpy – executes Forth commands on a single line.</a:t>
             </a:r>
           </a:p>
           <a:p>
             <a:r>
               <a:rPr lang="en-US" dirty="0"/>
-              <a:t>%%cfpy – Executes the code below the line.</a:t>
+              <a:t>%%cfpy – executes Forth commands in a cell.</a:t>
             </a:r>
           </a:p>
           <a:p>
             <a:r>
               <a:rPr lang="en-US" dirty="0"/>
-              <a:t>HELLO</a:t>
+              <a:t>%compdef – compiles Forth on a single line.</a:t>
             </a:r>
           </a:p>
           <a:p>
             <a:r>
               <a:rPr lang="en-US" dirty="0"/>
-              <a:t>%compdef  : T2 TEST </a:t>
-            </a:r>
-            <a:r>
-              <a:rPr lang="en-US" dirty="0" err="1"/>
-              <a:t>TEST</a:t>
-            </a:r>
-            <a:r>
-              <a:rPr lang="en-US" dirty="0"/>
-              <a:t> ;</a:t>
-            </a:r>
-          </a:p>
-          <a:p>
-            <a:r>
-              <a:rPr lang="en-US" dirty="0"/>
-              <a:t>%%compdef </a:t>
-            </a:r>
-          </a:p>
-          <a:p>
-            <a:r>
-              <a:rPr lang="en-US" dirty="0"/>
-              <a:t>: TESTS 0 DO TEST LOOP ;</a:t>
-            </a:r>
-          </a:p>
-          <a:p>
-            <a:r>
-              <a:rPr lang="en-US" dirty="0"/>
-              <a:t>%cfpy 3 TESTS</a:t>
+              <a:t>%%compdef – compiles Forth in a cell. </a:t>
             </a:r>
           </a:p>
         </p:txBody>
@@ -13407,7 +13610,7 @@
           <p:cNvPr id="4" name="Date Placeholder 3">
             <a:extLst>
               <a:ext uri="{FF2B5EF4-FFF2-40B4-BE49-F238E27FC236}">
-                <a16:creationId xmlns:a16="http://schemas.microsoft.com/office/drawing/2014/main" id="{ECA3E3B6-FC0F-3684-ECA8-761F1F05A209}"/>
+                <a16:creationId xmlns:a16="http://schemas.microsoft.com/office/drawing/2014/main" id="{6F12FB65-2BA5-5A57-A941-D6820CDFB6CA}"/>
               </a:ext>
             </a:extLst>
           </p:cNvPr>
@@ -13435,7 +13638,7 @@
           <p:cNvPr id="5" name="Footer Placeholder 4">
             <a:extLst>
               <a:ext uri="{FF2B5EF4-FFF2-40B4-BE49-F238E27FC236}">
-                <a16:creationId xmlns:a16="http://schemas.microsoft.com/office/drawing/2014/main" id="{8EDB4C77-6587-40AF-3904-A5A226A4651D}"/>
+                <a16:creationId xmlns:a16="http://schemas.microsoft.com/office/drawing/2014/main" id="{1515BC2D-0C20-1E19-D645-57A9133AE5A4}"/>
               </a:ext>
             </a:extLst>
           </p:cNvPr>
@@ -13451,6 +13654,10 @@
           <a:bodyPr/>
           <a:lstStyle/>
           <a:p>
+            <a:r>
+              <a:rPr lang="en-US"/>
+              <a:t>Presentation Title</a:t>
+            </a:r>
             <a:endParaRPr lang="en-US" dirty="0"/>
           </a:p>
         </p:txBody>
@@ -13460,7 +13667,7 @@
           <p:cNvPr id="6" name="Slide Number Placeholder 5">
             <a:extLst>
               <a:ext uri="{FF2B5EF4-FFF2-40B4-BE49-F238E27FC236}">
-                <a16:creationId xmlns:a16="http://schemas.microsoft.com/office/drawing/2014/main" id="{D1BC21BC-E143-9341-BF16-9C73184C9CDB}"/>
+                <a16:creationId xmlns:a16="http://schemas.microsoft.com/office/drawing/2014/main" id="{65CA92FC-A5A3-ABEB-8A40-82C6A7114F27}"/>
               </a:ext>
             </a:extLst>
           </p:cNvPr>
@@ -13488,7 +13695,7 @@
     </p:spTree>
     <p:extLst>
       <p:ext uri="{BB962C8B-B14F-4D97-AF65-F5344CB8AC3E}">
-        <p14:creationId xmlns:p14="http://schemas.microsoft.com/office/powerpoint/2010/main" val="219983092"/>
+        <p14:creationId xmlns:p14="http://schemas.microsoft.com/office/powerpoint/2010/main" val="58144141"/>
       </p:ext>
     </p:extLst>
   </p:cSld>
@@ -13533,14 +13740,12 @@
         </p:nvSpPr>
         <p:spPr/>
         <p:txBody>
-          <a:bodyPr>
-            <a:normAutofit fontScale="90000"/>
-          </a:bodyPr>
+          <a:bodyPr/>
           <a:lstStyle/>
           <a:p>
             <a:r>
               <a:rPr lang="en-US" dirty="0"/>
-              <a:t>EXAMPLE: MACHINE LEARNING</a:t>
+              <a:t>Some simple Examples</a:t>
             </a:r>
           </a:p>
         </p:txBody>
@@ -13563,68 +13768,49 @@
         </p:nvSpPr>
         <p:spPr/>
         <p:txBody>
-          <a:bodyPr>
-            <a:normAutofit fontScale="70000" lnSpcReduction="20000"/>
-          </a:bodyPr>
+          <a:bodyPr/>
           <a:lstStyle/>
           <a:p>
             <a:r>
               <a:rPr lang="en-US" dirty="0"/>
-              <a:t>Data analyzed is of thousands of </a:t>
-            </a:r>
-            <a:r>
-              <a:rPr lang="en-US" dirty="0" err="1"/>
-              <a:t>urls</a:t>
-            </a:r>
+              <a:t>%cfpy HELLO – Executes the HELLO primitive</a:t>
+            </a:r>
+          </a:p>
+          <a:p>
             <a:r>
               <a:rPr lang="en-US" dirty="0"/>
-              <a:t> which are classified as phishing, suspicious or legitimate.</a:t>
+              <a:t>%%cfpy – Executes the code below the line.</a:t>
             </a:r>
           </a:p>
           <a:p>
             <a:r>
               <a:rPr lang="en-US" dirty="0"/>
-              <a:t>Exploratory data analysis, data cleaning, and looking for data correlations was initially done.</a:t>
+              <a:t>HELLO</a:t>
             </a:r>
           </a:p>
           <a:p>
             <a:r>
               <a:rPr lang="en-US" dirty="0"/>
-              <a:t>It was followed up with binary classification to mark sites as phishing or non-phishing.</a:t>
+              <a:t>%compdef  : T2 TEST TEST ;</a:t>
             </a:r>
           </a:p>
           <a:p>
             <a:r>
               <a:rPr lang="en-US" dirty="0"/>
-              <a:t>First logistic regression was done with plots to show the effectiveness of the model. </a:t>
+              <a:t>%%compdef </a:t>
             </a:r>
           </a:p>
           <a:p>
             <a:r>
               <a:rPr lang="en-US" dirty="0"/>
-              <a:t>It was then validated with K-fold cross-validation. </a:t>
+              <a:t>: TESTS 0 DO TEST LOOP ;</a:t>
             </a:r>
           </a:p>
           <a:p>
             <a:r>
               <a:rPr lang="en-US" dirty="0"/>
-              <a:t>This is a methodology that resamples data in order to find the efficacy of machine learning models. </a:t>
-            </a:r>
-          </a:p>
-          <a:p>
-            <a:r>
-              <a:rPr lang="en-US" dirty="0"/>
-              <a:t>Data is split into K subsamples. Each subsample is used as a testing set, while the remainder are used as training sets.</a:t>
-            </a:r>
-          </a:p>
-          <a:p>
-            <a:r>
-              <a:rPr lang="en-US" dirty="0"/>
-              <a:t>It checks the performance of the model on new data in order to avoid overfitting or underfitting the model.</a:t>
-            </a:r>
-          </a:p>
-          <a:p>
-            <a:endParaRPr lang="en-US" dirty="0"/>
+              <a:t>%cfpy 3 TESTS</a:t>
+            </a:r>
           </a:p>
         </p:txBody>
       </p:sp>
@@ -13714,7 +13900,7 @@
     </p:spTree>
     <p:extLst>
       <p:ext uri="{BB962C8B-B14F-4D97-AF65-F5344CB8AC3E}">
-        <p14:creationId xmlns:p14="http://schemas.microsoft.com/office/powerpoint/2010/main" val="3113115795"/>
+        <p14:creationId xmlns:p14="http://schemas.microsoft.com/office/powerpoint/2010/main" val="219983092"/>
       </p:ext>
     </p:extLst>
   </p:cSld>
@@ -14221,6 +14407,15 @@
 </file>
 
 <file path=customXml/item1.xml><?xml version="1.0" encoding="utf-8"?>
+<?mso-contentType ?>
+<FormTemplates xmlns="http://schemas.microsoft.com/sharepoint/v3/contenttype/forms">
+  <Display>DocumentLibraryForm</Display>
+  <Edit>DocumentLibraryForm</Edit>
+  <New>DocumentLibraryForm</New>
+</FormTemplates>
+</file>
+
+<file path=customXml/item2.xml><?xml version="1.0" encoding="utf-8"?>
 <ct:contentTypeSchema xmlns:ct="http://schemas.microsoft.com/office/2006/metadata/contentType" xmlns:ma="http://schemas.microsoft.com/office/2006/metadata/properties/metaAttributes" ct:_="" ma:_="" ma:contentTypeName="Document" ma:contentTypeID="0x01010079F111ED35F8CC479449609E8A0923A6" ma:contentTypeVersion="12" ma:contentTypeDescription="Create a new document." ma:contentTypeScope="" ma:versionID="426e97fa315356fffbdcd9876fe988c2">
   <xsd:schema xmlns:xsd="http://www.w3.org/2001/XMLSchema" xmlns:xs="http://www.w3.org/2001/XMLSchema" xmlns:p="http://schemas.microsoft.com/office/2006/metadata/properties" xmlns:ns2="71af3243-3dd4-4a8d-8c0d-dd76da1f02a5" xmlns:ns3="16c05727-aa75-4e4a-9b5f-8a80a1165891" targetNamespace="http://schemas.microsoft.com/office/2006/metadata/properties" ma:root="true" ma:fieldsID="14b8f0def80e6d70ce3def20c90759ae" ns2:_="" ns3:_="">
     <xsd:import namespace="71af3243-3dd4-4a8d-8c0d-dd76da1f02a5"/>
@@ -14441,15 +14636,6 @@
 </ct:contentTypeSchema>
 </file>
 
-<file path=customXml/item2.xml><?xml version="1.0" encoding="utf-8"?>
-<?mso-contentType ?>
-<FormTemplates xmlns="http://schemas.microsoft.com/sharepoint/v3/contenttype/forms">
-  <Display>DocumentLibraryForm</Display>
-  <Edit>DocumentLibraryForm</Edit>
-  <New>DocumentLibraryForm</New>
-</FormTemplates>
-</file>
-
 <file path=customXml/item3.xml><?xml version="1.0" encoding="utf-8"?>
 <p:properties xmlns:p="http://schemas.microsoft.com/office/2006/metadata/properties" xmlns:xsi="http://www.w3.org/2001/XMLSchema-instance" xmlns:pc="http://schemas.microsoft.com/office/infopath/2007/PartnerControls">
   <documentManagement>
@@ -14460,6 +14646,14 @@
 </file>
 
 <file path=customXml/itemProps1.xml><?xml version="1.0" encoding="utf-8"?>
+<ds:datastoreItem xmlns:ds="http://schemas.openxmlformats.org/officeDocument/2006/customXml" ds:itemID="{3C8E00D1-8EA3-4E42-801D-0253E1EAFC21}">
+  <ds:schemaRefs>
+    <ds:schemaRef ds:uri="http://schemas.microsoft.com/sharepoint/v3/contenttype/forms"/>
+  </ds:schemaRefs>
+</ds:datastoreItem>
+</file>
+
+<file path=customXml/itemProps2.xml><?xml version="1.0" encoding="utf-8"?>
 <ds:datastoreItem xmlns:ds="http://schemas.openxmlformats.org/officeDocument/2006/customXml" ds:itemID="{ABC329F5-30EE-4BF7-AA2A-B837B51416B4}">
   <ds:schemaRefs>
     <ds:schemaRef ds:uri="http://schemas.microsoft.com/office/2006/metadata/contentType"/>
@@ -14478,14 +14672,6 @@
 </ds:datastoreItem>
 </file>
 
-<file path=customXml/itemProps2.xml><?xml version="1.0" encoding="utf-8"?>
-<ds:datastoreItem xmlns:ds="http://schemas.openxmlformats.org/officeDocument/2006/customXml" ds:itemID="{3C8E00D1-8EA3-4E42-801D-0253E1EAFC21}">
-  <ds:schemaRefs>
-    <ds:schemaRef ds:uri="http://schemas.microsoft.com/sharepoint/v3/contenttype/forms"/>
-  </ds:schemaRefs>
-</ds:datastoreItem>
-</file>
-
 <file path=customXml/itemProps3.xml><?xml version="1.0" encoding="utf-8"?>
 <ds:datastoreItem xmlns:ds="http://schemas.openxmlformats.org/officeDocument/2006/customXml" ds:itemID="{99919F73-B6C2-4A43-95E2-833EC48925FE}">
   <ds:schemaRefs>

</xml_diff>

<commit_message>
Embed of comments in notebook plus module install
</commit_message>
<xml_diff>
--- a/cfpy_jupyter_demo.pptx
+++ b/cfpy_jupyter_demo.pptx
@@ -11435,31 +11435,6 @@
       </p:sp>
       <p:sp>
         <p:nvSpPr>
-          <p:cNvPr id="5" name="Footer Placeholder 4">
-            <a:extLst>
-              <a:ext uri="{FF2B5EF4-FFF2-40B4-BE49-F238E27FC236}">
-                <a16:creationId xmlns:a16="http://schemas.microsoft.com/office/drawing/2014/main" id="{8EDB4C77-6587-40AF-3904-A5A226A4651D}"/>
-              </a:ext>
-            </a:extLst>
-          </p:cNvPr>
-          <p:cNvSpPr>
-            <a:spLocks noGrp="1"/>
-          </p:cNvSpPr>
-          <p:nvPr>
-            <p:ph type="ftr" sz="quarter" idx="11"/>
-          </p:nvPr>
-        </p:nvSpPr>
-        <p:spPr/>
-        <p:txBody>
-          <a:bodyPr/>
-          <a:lstStyle/>
-          <a:p>
-            <a:endParaRPr lang="en-US" dirty="0"/>
-          </a:p>
-        </p:txBody>
-      </p:sp>
-      <p:sp>
-        <p:nvSpPr>
           <p:cNvPr id="6" name="Slide Number Placeholder 5">
             <a:extLst>
               <a:ext uri="{FF2B5EF4-FFF2-40B4-BE49-F238E27FC236}">
@@ -11600,15 +11575,7 @@
           <a:p>
             <a:r>
               <a:rPr lang="en-US" dirty="0"/>
-              <a:t>The files in Dropbox can then be viewed from any device with </a:t>
-            </a:r>
-            <a:r>
-              <a:rPr lang="en-US"/>
-              <a:t>access to Dropbox</a:t>
-            </a:r>
-            <a:r>
-              <a:rPr lang="en-US" dirty="0"/>
-              <a:t>, such as an iPad or Android. </a:t>
+              <a:t>The files in Dropbox can then be viewed from any device with access to Dropbox, such as an iPad or Android. </a:t>
             </a:r>
           </a:p>
         </p:txBody>
@@ -11638,35 +11605,6 @@
               <a:rPr lang="en-US" dirty="0"/>
               <a:t>April 2023</a:t>
             </a:r>
-          </a:p>
-        </p:txBody>
-      </p:sp>
-      <p:sp>
-        <p:nvSpPr>
-          <p:cNvPr id="5" name="Footer Placeholder 4">
-            <a:extLst>
-              <a:ext uri="{FF2B5EF4-FFF2-40B4-BE49-F238E27FC236}">
-                <a16:creationId xmlns:a16="http://schemas.microsoft.com/office/drawing/2014/main" id="{4809160A-7AB3-E820-02ED-7C09D0744D5D}"/>
-              </a:ext>
-            </a:extLst>
-          </p:cNvPr>
-          <p:cNvSpPr>
-            <a:spLocks noGrp="1"/>
-          </p:cNvSpPr>
-          <p:nvPr>
-            <p:ph type="ftr" sz="quarter" idx="11"/>
-          </p:nvPr>
-        </p:nvSpPr>
-        <p:spPr/>
-        <p:txBody>
-          <a:bodyPr/>
-          <a:lstStyle/>
-          <a:p>
-            <a:r>
-              <a:rPr lang="en-US"/>
-              <a:t>Presentation Title</a:t>
-            </a:r>
-            <a:endParaRPr lang="en-US" dirty="0"/>
           </a:p>
         </p:txBody>
       </p:sp>
@@ -12050,35 +11988,6 @@
               <a:rPr lang="en-US" dirty="0"/>
               <a:t>April 2023</a:t>
             </a:r>
-          </a:p>
-        </p:txBody>
-      </p:sp>
-      <p:sp>
-        <p:nvSpPr>
-          <p:cNvPr id="5" name="Footer Placeholder 4">
-            <a:extLst>
-              <a:ext uri="{FF2B5EF4-FFF2-40B4-BE49-F238E27FC236}">
-                <a16:creationId xmlns:a16="http://schemas.microsoft.com/office/drawing/2014/main" id="{ABB4030D-F28E-7485-BFAC-58BB57685720}"/>
-              </a:ext>
-            </a:extLst>
-          </p:cNvPr>
-          <p:cNvSpPr>
-            <a:spLocks noGrp="1"/>
-          </p:cNvSpPr>
-          <p:nvPr>
-            <p:ph type="ftr" sz="quarter" idx="11"/>
-          </p:nvPr>
-        </p:nvSpPr>
-        <p:spPr/>
-        <p:txBody>
-          <a:bodyPr/>
-          <a:lstStyle/>
-          <a:p>
-            <a:r>
-              <a:rPr lang="en-US"/>
-              <a:t>Presentation Title</a:t>
-            </a:r>
-            <a:endParaRPr lang="en-US" dirty="0"/>
           </a:p>
         </p:txBody>
       </p:sp>
@@ -12513,31 +12422,6 @@
       </p:sp>
       <p:sp>
         <p:nvSpPr>
-          <p:cNvPr id="5" name="Footer Placeholder 4">
-            <a:extLst>
-              <a:ext uri="{FF2B5EF4-FFF2-40B4-BE49-F238E27FC236}">
-                <a16:creationId xmlns:a16="http://schemas.microsoft.com/office/drawing/2014/main" id="{6A2B03AA-3DFE-5353-9676-5B5C1FED25E8}"/>
-              </a:ext>
-            </a:extLst>
-          </p:cNvPr>
-          <p:cNvSpPr>
-            <a:spLocks noGrp="1"/>
-          </p:cNvSpPr>
-          <p:nvPr>
-            <p:ph type="ftr" sz="quarter" idx="11"/>
-          </p:nvPr>
-        </p:nvSpPr>
-        <p:spPr/>
-        <p:txBody>
-          <a:bodyPr/>
-          <a:lstStyle/>
-          <a:p>
-            <a:endParaRPr lang="en-US" dirty="0"/>
-          </a:p>
-        </p:txBody>
-      </p:sp>
-      <p:sp>
-        <p:nvSpPr>
           <p:cNvPr id="6" name="Slide Number Placeholder 5">
             <a:extLst>
               <a:ext uri="{FF2B5EF4-FFF2-40B4-BE49-F238E27FC236}">
@@ -12703,31 +12587,6 @@
       </p:sp>
       <p:sp>
         <p:nvSpPr>
-          <p:cNvPr id="5" name="Footer Placeholder 4">
-            <a:extLst>
-              <a:ext uri="{FF2B5EF4-FFF2-40B4-BE49-F238E27FC236}">
-                <a16:creationId xmlns:a16="http://schemas.microsoft.com/office/drawing/2014/main" id="{6A2B03AA-3DFE-5353-9676-5B5C1FED25E8}"/>
-              </a:ext>
-            </a:extLst>
-          </p:cNvPr>
-          <p:cNvSpPr>
-            <a:spLocks noGrp="1"/>
-          </p:cNvSpPr>
-          <p:nvPr>
-            <p:ph type="ftr" sz="quarter" idx="11"/>
-          </p:nvPr>
-        </p:nvSpPr>
-        <p:spPr/>
-        <p:txBody>
-          <a:bodyPr/>
-          <a:lstStyle/>
-          <a:p>
-            <a:endParaRPr lang="en-US" dirty="0"/>
-          </a:p>
-        </p:txBody>
-      </p:sp>
-      <p:sp>
-        <p:nvSpPr>
           <p:cNvPr id="6" name="Slide Number Placeholder 5">
             <a:extLst>
               <a:ext uri="{FF2B5EF4-FFF2-40B4-BE49-F238E27FC236}">
@@ -12905,31 +12764,6 @@
       </p:sp>
       <p:sp>
         <p:nvSpPr>
-          <p:cNvPr id="5" name="Footer Placeholder 4">
-            <a:extLst>
-              <a:ext uri="{FF2B5EF4-FFF2-40B4-BE49-F238E27FC236}">
-                <a16:creationId xmlns:a16="http://schemas.microsoft.com/office/drawing/2014/main" id="{6A2B03AA-3DFE-5353-9676-5B5C1FED25E8}"/>
-              </a:ext>
-            </a:extLst>
-          </p:cNvPr>
-          <p:cNvSpPr>
-            <a:spLocks noGrp="1"/>
-          </p:cNvSpPr>
-          <p:nvPr>
-            <p:ph type="ftr" sz="quarter" idx="11"/>
-          </p:nvPr>
-        </p:nvSpPr>
-        <p:spPr/>
-        <p:txBody>
-          <a:bodyPr/>
-          <a:lstStyle/>
-          <a:p>
-            <a:endParaRPr lang="en-US" dirty="0"/>
-          </a:p>
-        </p:txBody>
-      </p:sp>
-      <p:sp>
-        <p:nvSpPr>
           <p:cNvPr id="6" name="Slide Number Placeholder 5">
             <a:extLst>
               <a:ext uri="{FF2B5EF4-FFF2-40B4-BE49-F238E27FC236}">
@@ -13082,31 +12916,6 @@
       </p:sp>
       <p:sp>
         <p:nvSpPr>
-          <p:cNvPr id="5" name="Footer Placeholder 4">
-            <a:extLst>
-              <a:ext uri="{FF2B5EF4-FFF2-40B4-BE49-F238E27FC236}">
-                <a16:creationId xmlns:a16="http://schemas.microsoft.com/office/drawing/2014/main" id="{6A2B03AA-3DFE-5353-9676-5B5C1FED25E8}"/>
-              </a:ext>
-            </a:extLst>
-          </p:cNvPr>
-          <p:cNvSpPr>
-            <a:spLocks noGrp="1"/>
-          </p:cNvSpPr>
-          <p:nvPr>
-            <p:ph type="ftr" sz="quarter" idx="11"/>
-          </p:nvPr>
-        </p:nvSpPr>
-        <p:spPr/>
-        <p:txBody>
-          <a:bodyPr/>
-          <a:lstStyle/>
-          <a:p>
-            <a:endParaRPr lang="en-US" dirty="0"/>
-          </a:p>
-        </p:txBody>
-      </p:sp>
-      <p:sp>
-        <p:nvSpPr>
           <p:cNvPr id="6" name="Slide Number Placeholder 5">
             <a:extLst>
               <a:ext uri="{FF2B5EF4-FFF2-40B4-BE49-F238E27FC236}">
@@ -13167,31 +12976,6 @@
       </p:grpSpPr>
       <p:sp>
         <p:nvSpPr>
-          <p:cNvPr id="5" name="Footer Placeholder 4">
-            <a:extLst>
-              <a:ext uri="{FF2B5EF4-FFF2-40B4-BE49-F238E27FC236}">
-                <a16:creationId xmlns:a16="http://schemas.microsoft.com/office/drawing/2014/main" id="{6A2B03AA-3DFE-5353-9676-5B5C1FED25E8}"/>
-              </a:ext>
-            </a:extLst>
-          </p:cNvPr>
-          <p:cNvSpPr>
-            <a:spLocks noGrp="1"/>
-          </p:cNvSpPr>
-          <p:nvPr>
-            <p:ph type="ftr" sz="quarter" idx="11"/>
-          </p:nvPr>
-        </p:nvSpPr>
-        <p:spPr/>
-        <p:txBody>
-          <a:bodyPr/>
-          <a:lstStyle/>
-          <a:p>
-            <a:endParaRPr lang="en-US" dirty="0"/>
-          </a:p>
-        </p:txBody>
-      </p:sp>
-      <p:sp>
-        <p:nvSpPr>
           <p:cNvPr id="2" name="Title 1">
             <a:extLst>
               <a:ext uri="{FF2B5EF4-FFF2-40B4-BE49-F238E27FC236}">
@@ -13448,31 +13232,6 @@
       </p:sp>
       <p:sp>
         <p:nvSpPr>
-          <p:cNvPr id="5" name="Footer Placeholder 4">
-            <a:extLst>
-              <a:ext uri="{FF2B5EF4-FFF2-40B4-BE49-F238E27FC236}">
-                <a16:creationId xmlns:a16="http://schemas.microsoft.com/office/drawing/2014/main" id="{6A2B03AA-3DFE-5353-9676-5B5C1FED25E8}"/>
-              </a:ext>
-            </a:extLst>
-          </p:cNvPr>
-          <p:cNvSpPr>
-            <a:spLocks noGrp="1"/>
-          </p:cNvSpPr>
-          <p:nvPr>
-            <p:ph type="ftr" sz="quarter" idx="11"/>
-          </p:nvPr>
-        </p:nvSpPr>
-        <p:spPr/>
-        <p:txBody>
-          <a:bodyPr/>
-          <a:lstStyle/>
-          <a:p>
-            <a:endParaRPr lang="en-US" dirty="0"/>
-          </a:p>
-        </p:txBody>
-      </p:sp>
-      <p:sp>
-        <p:nvSpPr>
           <p:cNvPr id="6" name="Slide Number Placeholder 5">
             <a:extLst>
               <a:ext uri="{FF2B5EF4-FFF2-40B4-BE49-F238E27FC236}">
@@ -13635,35 +13394,6 @@
       </p:sp>
       <p:sp>
         <p:nvSpPr>
-          <p:cNvPr id="5" name="Footer Placeholder 4">
-            <a:extLst>
-              <a:ext uri="{FF2B5EF4-FFF2-40B4-BE49-F238E27FC236}">
-                <a16:creationId xmlns:a16="http://schemas.microsoft.com/office/drawing/2014/main" id="{1515BC2D-0C20-1E19-D645-57A9133AE5A4}"/>
-              </a:ext>
-            </a:extLst>
-          </p:cNvPr>
-          <p:cNvSpPr>
-            <a:spLocks noGrp="1"/>
-          </p:cNvSpPr>
-          <p:nvPr>
-            <p:ph type="ftr" sz="quarter" idx="11"/>
-          </p:nvPr>
-        </p:nvSpPr>
-        <p:spPr/>
-        <p:txBody>
-          <a:bodyPr/>
-          <a:lstStyle/>
-          <a:p>
-            <a:r>
-              <a:rPr lang="en-US"/>
-              <a:t>Presentation Title</a:t>
-            </a:r>
-            <a:endParaRPr lang="en-US" dirty="0"/>
-          </a:p>
-        </p:txBody>
-      </p:sp>
-      <p:sp>
-        <p:nvSpPr>
           <p:cNvPr id="6" name="Slide Number Placeholder 5">
             <a:extLst>
               <a:ext uri="{FF2B5EF4-FFF2-40B4-BE49-F238E27FC236}">
@@ -13839,31 +13569,6 @@
               <a:rPr lang="en-US" dirty="0"/>
               <a:t>April 2023</a:t>
             </a:r>
-          </a:p>
-        </p:txBody>
-      </p:sp>
-      <p:sp>
-        <p:nvSpPr>
-          <p:cNvPr id="5" name="Footer Placeholder 4">
-            <a:extLst>
-              <a:ext uri="{FF2B5EF4-FFF2-40B4-BE49-F238E27FC236}">
-                <a16:creationId xmlns:a16="http://schemas.microsoft.com/office/drawing/2014/main" id="{8EDB4C77-6587-40AF-3904-A5A226A4651D}"/>
-              </a:ext>
-            </a:extLst>
-          </p:cNvPr>
-          <p:cNvSpPr>
-            <a:spLocks noGrp="1"/>
-          </p:cNvSpPr>
-          <p:nvPr>
-            <p:ph type="ftr" sz="quarter" idx="11"/>
-          </p:nvPr>
-        </p:nvSpPr>
-        <p:spPr/>
-        <p:txBody>
-          <a:bodyPr/>
-          <a:lstStyle/>
-          <a:p>
-            <a:endParaRPr lang="en-US" dirty="0"/>
           </a:p>
         </p:txBody>
       </p:sp>
@@ -14407,12 +14112,12 @@
 </file>
 
 <file path=customXml/item1.xml><?xml version="1.0" encoding="utf-8"?>
-<?mso-contentType ?>
-<FormTemplates xmlns="http://schemas.microsoft.com/sharepoint/v3/contenttype/forms">
-  <Display>DocumentLibraryForm</Display>
-  <Edit>DocumentLibraryForm</Edit>
-  <New>DocumentLibraryForm</New>
-</FormTemplates>
+<p:properties xmlns:p="http://schemas.microsoft.com/office/2006/metadata/properties" xmlns:xsi="http://www.w3.org/2001/XMLSchema-instance" xmlns:pc="http://schemas.microsoft.com/office/infopath/2007/PartnerControls">
+  <documentManagement>
+    <Status xmlns="71af3243-3dd4-4a8d-8c0d-dd76da1f02a5">Not started</Status>
+    <MediaServiceKeyPoints xmlns="71af3243-3dd4-4a8d-8c0d-dd76da1f02a5" xsi:nil="true"/>
+  </documentManagement>
+</p:properties>
 </file>
 
 <file path=customXml/item2.xml><?xml version="1.0" encoding="utf-8"?>
@@ -14637,18 +14342,20 @@
 </file>
 
 <file path=customXml/item3.xml><?xml version="1.0" encoding="utf-8"?>
-<p:properties xmlns:p="http://schemas.microsoft.com/office/2006/metadata/properties" xmlns:xsi="http://www.w3.org/2001/XMLSchema-instance" xmlns:pc="http://schemas.microsoft.com/office/infopath/2007/PartnerControls">
-  <documentManagement>
-    <Status xmlns="71af3243-3dd4-4a8d-8c0d-dd76da1f02a5">Not started</Status>
-    <MediaServiceKeyPoints xmlns="71af3243-3dd4-4a8d-8c0d-dd76da1f02a5" xsi:nil="true"/>
-  </documentManagement>
-</p:properties>
+<?mso-contentType ?>
+<FormTemplates xmlns="http://schemas.microsoft.com/sharepoint/v3/contenttype/forms">
+  <Display>DocumentLibraryForm</Display>
+  <Edit>DocumentLibraryForm</Edit>
+  <New>DocumentLibraryForm</New>
+</FormTemplates>
 </file>
 
 <file path=customXml/itemProps1.xml><?xml version="1.0" encoding="utf-8"?>
-<ds:datastoreItem xmlns:ds="http://schemas.openxmlformats.org/officeDocument/2006/customXml" ds:itemID="{3C8E00D1-8EA3-4E42-801D-0253E1EAFC21}">
+<ds:datastoreItem xmlns:ds="http://schemas.openxmlformats.org/officeDocument/2006/customXml" ds:itemID="{99919F73-B6C2-4A43-95E2-833EC48925FE}">
   <ds:schemaRefs>
-    <ds:schemaRef ds:uri="http://schemas.microsoft.com/sharepoint/v3/contenttype/forms"/>
+    <ds:schemaRef ds:uri="http://schemas.microsoft.com/office/2006/metadata/properties"/>
+    <ds:schemaRef ds:uri="http://schemas.microsoft.com/office/infopath/2007/PartnerControls"/>
+    <ds:schemaRef ds:uri="71af3243-3dd4-4a8d-8c0d-dd76da1f02a5"/>
   </ds:schemaRefs>
 </ds:datastoreItem>
 </file>
@@ -14673,11 +14380,9 @@
 </file>
 
 <file path=customXml/itemProps3.xml><?xml version="1.0" encoding="utf-8"?>
-<ds:datastoreItem xmlns:ds="http://schemas.openxmlformats.org/officeDocument/2006/customXml" ds:itemID="{99919F73-B6C2-4A43-95E2-833EC48925FE}">
+<ds:datastoreItem xmlns:ds="http://schemas.openxmlformats.org/officeDocument/2006/customXml" ds:itemID="{3C8E00D1-8EA3-4E42-801D-0253E1EAFC21}">
   <ds:schemaRefs>
-    <ds:schemaRef ds:uri="http://schemas.microsoft.com/office/2006/metadata/properties"/>
-    <ds:schemaRef ds:uri="http://schemas.microsoft.com/office/infopath/2007/PartnerControls"/>
-    <ds:schemaRef ds:uri="71af3243-3dd4-4a8d-8c0d-dd76da1f02a5"/>
+    <ds:schemaRef ds:uri="http://schemas.microsoft.com/sharepoint/v3/contenttype/forms"/>
   </ds:schemaRefs>
 </ds:datastoreItem>
 </file>
</xml_diff>

<commit_message>
Some minor corrections in wording 2
</commit_message>
<xml_diff>
--- a/cfpy_jupyter_demo.pptx
+++ b/cfpy_jupyter_demo.pptx
@@ -12537,7 +12537,15 @@
           <a:p>
             <a:r>
               <a:rPr lang="en-US" dirty="0"/>
-              <a:t>That means a Python written in Forth can work.</a:t>
+              <a:t>That means a Forth written </a:t>
+            </a:r>
+            <a:r>
+              <a:rPr lang="en-US"/>
+              <a:t>in Python can </a:t>
+            </a:r>
+            <a:r>
+              <a:rPr lang="en-US" dirty="0"/>
+              <a:t>work.</a:t>
             </a:r>
           </a:p>
           <a:p>

</xml_diff>

<commit_message>
Some minor corrections in wording 4
</commit_message>
<xml_diff>
--- a/cfpy_jupyter_demo.pptx
+++ b/cfpy_jupyter_demo.pptx
@@ -11224,8 +11224,12 @@
           <a:lstStyle/>
           <a:p>
             <a:r>
+              <a:rPr lang="en-US"/>
+              <a:t>Creole Forth </a:t>
+            </a:r>
+            <a:r>
               <a:rPr lang="en-US" dirty="0"/>
-              <a:t>Forth in a jupyter  notebook</a:t>
+              <a:t>in a jupyter  notebook</a:t>
             </a:r>
           </a:p>
         </p:txBody>
@@ -12537,15 +12541,7 @@
           <a:p>
             <a:r>
               <a:rPr lang="en-US" dirty="0"/>
-              <a:t>That means a Forth written </a:t>
-            </a:r>
-            <a:r>
-              <a:rPr lang="en-US"/>
-              <a:t>in Python can </a:t>
-            </a:r>
-            <a:r>
-              <a:rPr lang="en-US" dirty="0"/>
-              <a:t>work.</a:t>
+              <a:t>That means a Forth written in Python can work.</a:t>
             </a:r>
           </a:p>
           <a:p>

</xml_diff>